<commit_message>
Extended results of chapter 2
</commit_message>
<xml_diff>
--- a/figures/Presentation1.pptx
+++ b/figures/Presentation1.pptx
@@ -339,7 +339,7 @@
             <a:fld id="{CD72A38B-F9FA-4036-A084-652409E98F08}" type="datetimeFigureOut">
               <a:rPr lang="en-US" smtClean="0"/>
               <a:pPr/>
-              <a:t>7/3/2018</a:t>
+              <a:t>7/6/2018</a:t>
             </a:fld>
             <a:endParaRPr lang="en-US" dirty="0"/>
           </a:p>
@@ -12287,7 +12287,7 @@
           <a:graphicData uri="http://schemas.openxmlformats.org/presentationml/2006/ole">
             <mc:AlternateContent xmlns:mc="http://schemas.openxmlformats.org/markup-compatibility/2006">
               <mc:Choice xmlns:v="urn:schemas-microsoft-com:vml" Requires="v">
-                <p:oleObj spid="_x0000_s1028" name="think-cell Slide" r:id="rId44" imgW="353" imgH="353" progId="TCLayout.ActiveDocument.1">
+                <p:oleObj spid="_x0000_s1035" name="think-cell Slide" r:id="rId44" imgW="353" imgH="353" progId="TCLayout.ActiveDocument.1">
                   <p:embed/>
                 </p:oleObj>
               </mc:Choice>
@@ -13744,7 +13744,7 @@
                     <a:schemeClr val="bg1"/>
                   </a:solidFill>
                 </a:rPr>
-                <a:t>Quality control, validation and filtering</a:t>
+                <a:t>QC, Validation and Inference</a:t>
               </a:r>
             </a:p>
           </p:txBody>
@@ -13814,7 +13814,7 @@
                     <a:schemeClr val="bg1"/>
                   </a:solidFill>
                 </a:rPr>
-                <a:t>Protein inference</a:t>
+                <a:t>Feature Extraction</a:t>
               </a:r>
             </a:p>
           </p:txBody>
@@ -14210,10 +14210,10 @@
       </p:grpSp>
       <p:grpSp>
         <p:nvGrpSpPr>
-          <p:cNvPr id="34" name="Group 33">
+          <p:cNvPr id="32" name="Group 31">
             <a:extLst>
               <a:ext uri="{FF2B5EF4-FFF2-40B4-BE49-F238E27FC236}">
-                <a16:creationId xmlns:a16="http://schemas.microsoft.com/office/drawing/2014/main" id="{29B10DC7-419C-4C5C-A5EA-F36BBDCBDF0E}"/>
+                <a16:creationId xmlns:a16="http://schemas.microsoft.com/office/drawing/2014/main" id="{91D5D17E-6155-428D-85AE-28D06814684C}"/>
               </a:ext>
             </a:extLst>
           </p:cNvPr>
@@ -14222,24 +14222,23 @@
         </p:nvGrpSpPr>
         <p:grpSpPr>
           <a:xfrm>
-            <a:off x="6519515" y="1938477"/>
-            <a:ext cx="279138" cy="2292002"/>
+            <a:off x="6519515" y="1938476"/>
+            <a:ext cx="279138" cy="3221565"/>
             <a:chOff x="6519515" y="1938477"/>
             <a:chExt cx="279138" cy="2292002"/>
           </a:xfrm>
         </p:grpSpPr>
         <p:cxnSp>
           <p:nvCxnSpPr>
-            <p:cNvPr id="3" name="Straight Arrow Connector 2">
+            <p:cNvPr id="33" name="Straight Arrow Connector 32">
               <a:extLst>
                 <a:ext uri="{FF2B5EF4-FFF2-40B4-BE49-F238E27FC236}">
-                  <a16:creationId xmlns:a16="http://schemas.microsoft.com/office/drawing/2014/main" id="{0E7FC5B3-EE81-4B62-A82F-D6D23C4F8AC6}"/>
+                  <a16:creationId xmlns:a16="http://schemas.microsoft.com/office/drawing/2014/main" id="{80E5D74D-E998-43CE-8EB1-4C9E0F8B459C}"/>
                 </a:ext>
               </a:extLst>
             </p:cNvPr>
             <p:cNvCxnSpPr>
               <a:cxnSpLocks/>
-              <a:endCxn id="12" idx="1"/>
             </p:cNvCxnSpPr>
             <p:nvPr/>
           </p:nvCxnSpPr>
@@ -14276,10 +14275,10 @@
         </p:cxnSp>
         <p:cxnSp>
           <p:nvCxnSpPr>
-            <p:cNvPr id="22" name="Straight Connector 21">
+            <p:cNvPr id="35" name="Straight Connector 34">
               <a:extLst>
                 <a:ext uri="{FF2B5EF4-FFF2-40B4-BE49-F238E27FC236}">
-                  <a16:creationId xmlns:a16="http://schemas.microsoft.com/office/drawing/2014/main" id="{5E120E3D-A9C0-408F-A643-7CC952FB8354}"/>
+                  <a16:creationId xmlns:a16="http://schemas.microsoft.com/office/drawing/2014/main" id="{18DFD955-724E-4DC2-A0C4-555B4A44DCD6}"/>
                 </a:ext>
               </a:extLst>
             </p:cNvPr>
@@ -15152,7 +15151,7 @@
                     <a:schemeClr val="bg1"/>
                   </a:solidFill>
                 </a:rPr>
-                <a:t>Quality control, validation and filtering</a:t>
+                <a:t>QC, Validation and Inference</a:t>
               </a:r>
             </a:p>
           </p:txBody>
@@ -15222,7 +15221,7 @@
                     <a:schemeClr val="bg1"/>
                   </a:solidFill>
                 </a:rPr>
-                <a:t>Protein inference</a:t>
+                <a:t>Feature Extraction</a:t>
               </a:r>
             </a:p>
           </p:txBody>
@@ -15638,8 +15637,8 @@
         </p:nvGrpSpPr>
         <p:grpSpPr>
           <a:xfrm>
-            <a:off x="6519515" y="1938477"/>
-            <a:ext cx="279138" cy="2292002"/>
+            <a:off x="6519515" y="1938476"/>
+            <a:ext cx="279138" cy="3221565"/>
             <a:chOff x="6519515" y="1938477"/>
             <a:chExt cx="279138" cy="2292002"/>
           </a:xfrm>
@@ -15764,806 +15763,12 @@
           <a:chExt cx="0" cy="0"/>
         </a:xfrm>
       </p:grpSpPr>
-      <p:sp>
-        <p:nvSpPr>
-          <p:cNvPr id="30" name="Rectangle 29">
+      <p:grpSp>
+        <p:nvGrpSpPr>
+          <p:cNvPr id="56" name="Group 55">
             <a:extLst>
               <a:ext uri="{FF2B5EF4-FFF2-40B4-BE49-F238E27FC236}">
-                <a16:creationId xmlns:a16="http://schemas.microsoft.com/office/drawing/2014/main" id="{45DEE638-CC0F-4883-9AA0-8B23B90D1987}"/>
-              </a:ext>
-            </a:extLst>
-          </p:cNvPr>
-          <p:cNvSpPr/>
-          <p:nvPr/>
-        </p:nvSpPr>
-        <p:spPr>
-          <a:xfrm>
-            <a:off x="10136650" y="6104932"/>
-            <a:ext cx="2055350" cy="753068"/>
-          </a:xfrm>
-          <a:prstGeom prst="rect">
-            <a:avLst/>
-          </a:prstGeom>
-          <a:solidFill>
-            <a:schemeClr val="bg1"/>
-          </a:solidFill>
-          <a:ln>
-            <a:noFill/>
-          </a:ln>
-        </p:spPr>
-        <p:style>
-          <a:lnRef idx="2">
-            <a:schemeClr val="accent1">
-              <a:shade val="50000"/>
-            </a:schemeClr>
-          </a:lnRef>
-          <a:fillRef idx="1">
-            <a:schemeClr val="accent1"/>
-          </a:fillRef>
-          <a:effectRef idx="0">
-            <a:schemeClr val="accent1"/>
-          </a:effectRef>
-          <a:fontRef idx="minor">
-            <a:schemeClr val="lt1"/>
-          </a:fontRef>
-        </p:style>
-        <p:txBody>
-          <a:bodyPr rot="0" spcFirstLastPara="0" vertOverflow="overflow" horzOverflow="overflow" vert="horz" wrap="square" lIns="91440" tIns="45720" rIns="91440" bIns="45720" numCol="1" spcCol="0" rtlCol="0" fromWordArt="0" anchor="ctr" anchorCtr="0" forceAA="0" compatLnSpc="1">
-            <a:prstTxWarp prst="textNoShape">
-              <a:avLst/>
-            </a:prstTxWarp>
-            <a:noAutofit/>
-          </a:bodyPr>
-          <a:lstStyle/>
-          <a:p>
-            <a:pPr algn="ctr">
-              <a:lnSpc>
-                <a:spcPct val="97000"/>
-              </a:lnSpc>
-            </a:pPr>
-            <a:endParaRPr lang="en-US" dirty="0" err="1">
-              <a:solidFill>
-                <a:schemeClr val="tx1"/>
-              </a:solidFill>
-            </a:endParaRPr>
-          </a:p>
-        </p:txBody>
-      </p:sp>
-      <p:sp>
-        <p:nvSpPr>
-          <p:cNvPr id="15" name="Arrow: Bent 14">
-            <a:extLst>
-              <a:ext uri="{FF2B5EF4-FFF2-40B4-BE49-F238E27FC236}">
-                <a16:creationId xmlns:a16="http://schemas.microsoft.com/office/drawing/2014/main" id="{D96ED481-D610-4749-8555-15C9FD366159}"/>
-              </a:ext>
-            </a:extLst>
-          </p:cNvPr>
-          <p:cNvSpPr/>
-          <p:nvPr/>
-        </p:nvSpPr>
-        <p:spPr>
-          <a:xfrm rot="5400000">
-            <a:off x="-227193" y="2352682"/>
-            <a:ext cx="4392462" cy="2171662"/>
-          </a:xfrm>
-          <a:prstGeom prst="bentArrow">
-            <a:avLst>
-              <a:gd name="adj1" fmla="val 10277"/>
-              <a:gd name="adj2" fmla="val 9038"/>
-              <a:gd name="adj3" fmla="val 9444"/>
-              <a:gd name="adj4" fmla="val 43750"/>
-            </a:avLst>
-          </a:prstGeom>
-          <a:solidFill>
-            <a:srgbClr val="2C9FD1"/>
-          </a:solidFill>
-          <a:ln>
-            <a:noFill/>
-          </a:ln>
-        </p:spPr>
-        <p:style>
-          <a:lnRef idx="2">
-            <a:schemeClr val="accent1">
-              <a:shade val="50000"/>
-            </a:schemeClr>
-          </a:lnRef>
-          <a:fillRef idx="1">
-            <a:schemeClr val="accent1"/>
-          </a:fillRef>
-          <a:effectRef idx="0">
-            <a:schemeClr val="accent1"/>
-          </a:effectRef>
-          <a:fontRef idx="minor">
-            <a:schemeClr val="lt1"/>
-          </a:fontRef>
-        </p:style>
-        <p:txBody>
-          <a:bodyPr rot="0" spcFirstLastPara="0" vertOverflow="overflow" horzOverflow="overflow" vert="horz" wrap="square" lIns="91440" tIns="45720" rIns="91440" bIns="45720" numCol="1" spcCol="0" rtlCol="0" fromWordArt="0" anchor="ctr" anchorCtr="0" forceAA="0" compatLnSpc="1">
-            <a:prstTxWarp prst="textNoShape">
-              <a:avLst/>
-            </a:prstTxWarp>
-            <a:noAutofit/>
-          </a:bodyPr>
-          <a:lstStyle/>
-          <a:p>
-            <a:pPr algn="ctr">
-              <a:lnSpc>
-                <a:spcPct val="97000"/>
-              </a:lnSpc>
-            </a:pPr>
-            <a:endParaRPr lang="en-US" dirty="0" err="1">
-              <a:solidFill>
-                <a:schemeClr val="tx1"/>
-              </a:solidFill>
-            </a:endParaRPr>
-          </a:p>
-        </p:txBody>
-      </p:sp>
-      <p:sp>
-        <p:nvSpPr>
-          <p:cNvPr id="28" name="Rectangle 27">
-            <a:extLst>
-              <a:ext uri="{FF2B5EF4-FFF2-40B4-BE49-F238E27FC236}">
-                <a16:creationId xmlns:a16="http://schemas.microsoft.com/office/drawing/2014/main" id="{7F692F3F-D527-491E-B480-DD55D8A4F299}"/>
-              </a:ext>
-            </a:extLst>
-          </p:cNvPr>
-          <p:cNvSpPr/>
-          <p:nvPr/>
-        </p:nvSpPr>
-        <p:spPr>
-          <a:xfrm>
-            <a:off x="408989" y="90312"/>
-            <a:ext cx="4475527" cy="6377650"/>
-          </a:xfrm>
-          <a:prstGeom prst="rect">
-            <a:avLst/>
-          </a:prstGeom>
-          <a:noFill/>
-          <a:ln w="57150">
-            <a:solidFill>
-              <a:schemeClr val="tx1"/>
-            </a:solidFill>
-          </a:ln>
-        </p:spPr>
-        <p:style>
-          <a:lnRef idx="2">
-            <a:schemeClr val="accent1">
-              <a:shade val="50000"/>
-            </a:schemeClr>
-          </a:lnRef>
-          <a:fillRef idx="1">
-            <a:schemeClr val="accent1"/>
-          </a:fillRef>
-          <a:effectRef idx="0">
-            <a:schemeClr val="accent1"/>
-          </a:effectRef>
-          <a:fontRef idx="minor">
-            <a:schemeClr val="lt1"/>
-          </a:fontRef>
-        </p:style>
-        <p:txBody>
-          <a:bodyPr rot="0" spcFirstLastPara="0" vertOverflow="overflow" horzOverflow="overflow" vert="horz" wrap="square" lIns="91440" tIns="45720" rIns="91440" bIns="45720" numCol="1" spcCol="0" rtlCol="0" fromWordArt="0" anchor="ctr" anchorCtr="0" forceAA="0" compatLnSpc="1">
-            <a:prstTxWarp prst="textNoShape">
-              <a:avLst/>
-            </a:prstTxWarp>
-            <a:noAutofit/>
-          </a:bodyPr>
-          <a:lstStyle/>
-          <a:p>
-            <a:pPr algn="ctr">
-              <a:lnSpc>
-                <a:spcPct val="97000"/>
-              </a:lnSpc>
-            </a:pPr>
-            <a:endParaRPr lang="en-US" dirty="0" err="1">
-              <a:solidFill>
-                <a:schemeClr val="tx1"/>
-              </a:solidFill>
-            </a:endParaRPr>
-          </a:p>
-        </p:txBody>
-      </p:sp>
-      <p:sp>
-        <p:nvSpPr>
-          <p:cNvPr id="7" name="Rectangle: Rounded Corners 6">
-            <a:extLst>
-              <a:ext uri="{FF2B5EF4-FFF2-40B4-BE49-F238E27FC236}">
-                <a16:creationId xmlns:a16="http://schemas.microsoft.com/office/drawing/2014/main" id="{78D5A450-F67B-496E-8B00-2D9F554E6220}"/>
-              </a:ext>
-            </a:extLst>
-          </p:cNvPr>
-          <p:cNvSpPr/>
-          <p:nvPr/>
-        </p:nvSpPr>
-        <p:spPr>
-          <a:xfrm>
-            <a:off x="736959" y="808218"/>
-            <a:ext cx="1345223" cy="1099039"/>
-          </a:xfrm>
-          <a:prstGeom prst="roundRect">
-            <a:avLst/>
-          </a:prstGeom>
-          <a:solidFill>
-            <a:srgbClr val="002060"/>
-          </a:solidFill>
-          <a:ln>
-            <a:noFill/>
-          </a:ln>
-        </p:spPr>
-        <p:style>
-          <a:lnRef idx="2">
-            <a:schemeClr val="accent1">
-              <a:shade val="50000"/>
-            </a:schemeClr>
-          </a:lnRef>
-          <a:fillRef idx="1">
-            <a:schemeClr val="accent1"/>
-          </a:fillRef>
-          <a:effectRef idx="0">
-            <a:schemeClr val="accent1"/>
-          </a:effectRef>
-          <a:fontRef idx="minor">
-            <a:schemeClr val="lt1"/>
-          </a:fontRef>
-        </p:style>
-        <p:txBody>
-          <a:bodyPr rot="0" spcFirstLastPara="0" vertOverflow="overflow" horzOverflow="overflow" vert="horz" wrap="square" lIns="91440" tIns="45720" rIns="91440" bIns="45720" numCol="1" spcCol="0" rtlCol="0" fromWordArt="0" anchor="ctr" anchorCtr="0" forceAA="0" compatLnSpc="1">
-            <a:prstTxWarp prst="textNoShape">
-              <a:avLst/>
-            </a:prstTxWarp>
-            <a:noAutofit/>
-          </a:bodyPr>
-          <a:lstStyle/>
-          <a:p>
-            <a:pPr algn="ctr">
-              <a:lnSpc>
-                <a:spcPct val="97000"/>
-              </a:lnSpc>
-            </a:pPr>
-            <a:r>
-              <a:rPr lang="en-US" dirty="0">
-                <a:solidFill>
-                  <a:schemeClr val="bg1"/>
-                </a:solidFill>
-              </a:rPr>
-              <a:t>.RAW files</a:t>
-            </a:r>
-          </a:p>
-        </p:txBody>
-      </p:sp>
-      <p:sp>
-        <p:nvSpPr>
-          <p:cNvPr id="10" name="Rectangle: Rounded Corners 9">
-            <a:extLst>
-              <a:ext uri="{FF2B5EF4-FFF2-40B4-BE49-F238E27FC236}">
-                <a16:creationId xmlns:a16="http://schemas.microsoft.com/office/drawing/2014/main" id="{C1965BF3-4993-4D9D-A44F-C9EF5ECBD135}"/>
-              </a:ext>
-            </a:extLst>
-          </p:cNvPr>
-          <p:cNvSpPr/>
-          <p:nvPr/>
-        </p:nvSpPr>
-        <p:spPr>
-          <a:xfrm>
-            <a:off x="1323828" y="2047935"/>
-            <a:ext cx="3326422" cy="597600"/>
-          </a:xfrm>
-          <a:prstGeom prst="roundRect">
-            <a:avLst/>
-          </a:prstGeom>
-          <a:solidFill>
-            <a:srgbClr val="F8D14C"/>
-          </a:solidFill>
-          <a:ln>
-            <a:solidFill>
-              <a:srgbClr val="C5DA00"/>
-            </a:solidFill>
-          </a:ln>
-        </p:spPr>
-        <p:style>
-          <a:lnRef idx="2">
-            <a:schemeClr val="accent1">
-              <a:shade val="50000"/>
-            </a:schemeClr>
-          </a:lnRef>
-          <a:fillRef idx="1">
-            <a:schemeClr val="accent1"/>
-          </a:fillRef>
-          <a:effectRef idx="0">
-            <a:schemeClr val="accent1"/>
-          </a:effectRef>
-          <a:fontRef idx="minor">
-            <a:schemeClr val="lt1"/>
-          </a:fontRef>
-        </p:style>
-        <p:txBody>
-          <a:bodyPr rot="0" spcFirstLastPara="0" vertOverflow="overflow" horzOverflow="overflow" vert="horz" wrap="square" lIns="91440" tIns="45720" rIns="91440" bIns="45720" numCol="1" spcCol="0" rtlCol="0" fromWordArt="0" anchor="ctr" anchorCtr="0" forceAA="0" compatLnSpc="1">
-            <a:prstTxWarp prst="textNoShape">
-              <a:avLst/>
-            </a:prstTxWarp>
-            <a:noAutofit/>
-          </a:bodyPr>
-          <a:lstStyle/>
-          <a:p>
-            <a:pPr algn="ctr">
-              <a:lnSpc>
-                <a:spcPct val="97000"/>
-              </a:lnSpc>
-            </a:pPr>
-            <a:r>
-              <a:rPr lang="en-US" dirty="0">
-                <a:solidFill>
-                  <a:schemeClr val="bg1"/>
-                </a:solidFill>
-              </a:rPr>
-              <a:t>Open format conversion (MGF)</a:t>
-            </a:r>
-          </a:p>
-        </p:txBody>
-      </p:sp>
-      <p:sp>
-        <p:nvSpPr>
-          <p:cNvPr id="11" name="Rectangle: Rounded Corners 10">
-            <a:extLst>
-              <a:ext uri="{FF2B5EF4-FFF2-40B4-BE49-F238E27FC236}">
-                <a16:creationId xmlns:a16="http://schemas.microsoft.com/office/drawing/2014/main" id="{B756DF75-B295-4063-B804-7078E3CA2E31}"/>
-              </a:ext>
-            </a:extLst>
-          </p:cNvPr>
-          <p:cNvSpPr/>
-          <p:nvPr/>
-        </p:nvSpPr>
-        <p:spPr>
-          <a:xfrm>
-            <a:off x="1323828" y="2960870"/>
-            <a:ext cx="3326422" cy="597600"/>
-          </a:xfrm>
-          <a:prstGeom prst="roundRect">
-            <a:avLst/>
-          </a:prstGeom>
-          <a:solidFill>
-            <a:srgbClr val="F8D14C"/>
-          </a:solidFill>
-          <a:ln>
-            <a:solidFill>
-              <a:srgbClr val="C5DA00"/>
-            </a:solidFill>
-          </a:ln>
-        </p:spPr>
-        <p:style>
-          <a:lnRef idx="2">
-            <a:schemeClr val="accent1">
-              <a:shade val="50000"/>
-            </a:schemeClr>
-          </a:lnRef>
-          <a:fillRef idx="1">
-            <a:schemeClr val="accent1"/>
-          </a:fillRef>
-          <a:effectRef idx="0">
-            <a:schemeClr val="accent1"/>
-          </a:effectRef>
-          <a:fontRef idx="minor">
-            <a:schemeClr val="lt1"/>
-          </a:fontRef>
-        </p:style>
-        <p:txBody>
-          <a:bodyPr rot="0" spcFirstLastPara="0" vertOverflow="overflow" horzOverflow="overflow" vert="horz" wrap="square" lIns="91440" tIns="45720" rIns="91440" bIns="45720" numCol="1" spcCol="0" rtlCol="0" fromWordArt="0" anchor="ctr" anchorCtr="0" forceAA="0" compatLnSpc="1">
-            <a:prstTxWarp prst="textNoShape">
-              <a:avLst/>
-            </a:prstTxWarp>
-            <a:noAutofit/>
-          </a:bodyPr>
-          <a:lstStyle/>
-          <a:p>
-            <a:pPr algn="ctr">
-              <a:lnSpc>
-                <a:spcPct val="97000"/>
-              </a:lnSpc>
-            </a:pPr>
-            <a:r>
-              <a:rPr lang="en-US" dirty="0">
-                <a:solidFill>
-                  <a:schemeClr val="bg1"/>
-                </a:solidFill>
-              </a:rPr>
-              <a:t>Peptide to Spectrum matching (PSM)</a:t>
-            </a:r>
-          </a:p>
-        </p:txBody>
-      </p:sp>
-      <p:sp>
-        <p:nvSpPr>
-          <p:cNvPr id="12" name="Rectangle: Rounded Corners 11">
-            <a:extLst>
-              <a:ext uri="{FF2B5EF4-FFF2-40B4-BE49-F238E27FC236}">
-                <a16:creationId xmlns:a16="http://schemas.microsoft.com/office/drawing/2014/main" id="{67DD93A6-7BEB-48FA-97C4-48A25770CB6A}"/>
-              </a:ext>
-            </a:extLst>
-          </p:cNvPr>
-          <p:cNvSpPr/>
-          <p:nvPr/>
-        </p:nvSpPr>
-        <p:spPr>
-          <a:xfrm>
-            <a:off x="1323828" y="3873805"/>
-            <a:ext cx="3326422" cy="597600"/>
-          </a:xfrm>
-          <a:prstGeom prst="roundRect">
-            <a:avLst/>
-          </a:prstGeom>
-          <a:solidFill>
-            <a:srgbClr val="F8D14C"/>
-          </a:solidFill>
-          <a:ln>
-            <a:solidFill>
-              <a:srgbClr val="C5DA00"/>
-            </a:solidFill>
-          </a:ln>
-        </p:spPr>
-        <p:style>
-          <a:lnRef idx="2">
-            <a:schemeClr val="accent1">
-              <a:shade val="50000"/>
-            </a:schemeClr>
-          </a:lnRef>
-          <a:fillRef idx="1">
-            <a:schemeClr val="accent1"/>
-          </a:fillRef>
-          <a:effectRef idx="0">
-            <a:schemeClr val="accent1"/>
-          </a:effectRef>
-          <a:fontRef idx="minor">
-            <a:schemeClr val="lt1"/>
-          </a:fontRef>
-        </p:style>
-        <p:txBody>
-          <a:bodyPr rot="0" spcFirstLastPara="0" vertOverflow="overflow" horzOverflow="overflow" vert="horz" wrap="square" lIns="91440" tIns="45720" rIns="91440" bIns="45720" numCol="1" spcCol="0" rtlCol="0" fromWordArt="0" anchor="ctr" anchorCtr="0" forceAA="0" compatLnSpc="1">
-            <a:prstTxWarp prst="textNoShape">
-              <a:avLst/>
-            </a:prstTxWarp>
-            <a:noAutofit/>
-          </a:bodyPr>
-          <a:lstStyle/>
-          <a:p>
-            <a:pPr algn="ctr">
-              <a:lnSpc>
-                <a:spcPct val="97000"/>
-              </a:lnSpc>
-            </a:pPr>
-            <a:r>
-              <a:rPr lang="en-US" dirty="0">
-                <a:solidFill>
-                  <a:schemeClr val="bg1"/>
-                </a:solidFill>
-              </a:rPr>
-              <a:t>Quality control, validation and filtering</a:t>
-            </a:r>
-          </a:p>
-        </p:txBody>
-      </p:sp>
-      <p:sp>
-        <p:nvSpPr>
-          <p:cNvPr id="13" name="Rectangle: Rounded Corners 12">
-            <a:extLst>
-              <a:ext uri="{FF2B5EF4-FFF2-40B4-BE49-F238E27FC236}">
-                <a16:creationId xmlns:a16="http://schemas.microsoft.com/office/drawing/2014/main" id="{7F832371-63C7-474E-8E2C-0878EBB76199}"/>
-              </a:ext>
-            </a:extLst>
-          </p:cNvPr>
-          <p:cNvSpPr/>
-          <p:nvPr/>
-        </p:nvSpPr>
-        <p:spPr>
-          <a:xfrm>
-            <a:off x="1323828" y="4786740"/>
-            <a:ext cx="3326422" cy="597600"/>
-          </a:xfrm>
-          <a:prstGeom prst="roundRect">
-            <a:avLst/>
-          </a:prstGeom>
-          <a:solidFill>
-            <a:srgbClr val="F8D14C"/>
-          </a:solidFill>
-          <a:ln>
-            <a:solidFill>
-              <a:srgbClr val="C5DA00"/>
-            </a:solidFill>
-          </a:ln>
-        </p:spPr>
-        <p:style>
-          <a:lnRef idx="2">
-            <a:schemeClr val="accent1">
-              <a:shade val="50000"/>
-            </a:schemeClr>
-          </a:lnRef>
-          <a:fillRef idx="1">
-            <a:schemeClr val="accent1"/>
-          </a:fillRef>
-          <a:effectRef idx="0">
-            <a:schemeClr val="accent1"/>
-          </a:effectRef>
-          <a:fontRef idx="minor">
-            <a:schemeClr val="lt1"/>
-          </a:fontRef>
-        </p:style>
-        <p:txBody>
-          <a:bodyPr rot="0" spcFirstLastPara="0" vertOverflow="overflow" horzOverflow="overflow" vert="horz" wrap="square" lIns="91440" tIns="45720" rIns="91440" bIns="45720" numCol="1" spcCol="0" rtlCol="0" fromWordArt="0" anchor="ctr" anchorCtr="0" forceAA="0" compatLnSpc="1">
-            <a:prstTxWarp prst="textNoShape">
-              <a:avLst/>
-            </a:prstTxWarp>
-            <a:noAutofit/>
-          </a:bodyPr>
-          <a:lstStyle/>
-          <a:p>
-            <a:pPr algn="ctr">
-              <a:lnSpc>
-                <a:spcPct val="97000"/>
-              </a:lnSpc>
-            </a:pPr>
-            <a:r>
-              <a:rPr lang="en-US" dirty="0">
-                <a:solidFill>
-                  <a:schemeClr val="bg1"/>
-                </a:solidFill>
-              </a:rPr>
-              <a:t>Protein inference</a:t>
-            </a:r>
-          </a:p>
-        </p:txBody>
-      </p:sp>
-      <p:sp>
-        <p:nvSpPr>
-          <p:cNvPr id="14" name="Rectangle: Rounded Corners 13">
-            <a:extLst>
-              <a:ext uri="{FF2B5EF4-FFF2-40B4-BE49-F238E27FC236}">
-                <a16:creationId xmlns:a16="http://schemas.microsoft.com/office/drawing/2014/main" id="{A18AB81A-5908-4C89-8838-5940125BC5EB}"/>
-              </a:ext>
-            </a:extLst>
-          </p:cNvPr>
-          <p:cNvSpPr/>
-          <p:nvPr/>
-        </p:nvSpPr>
-        <p:spPr>
-          <a:xfrm>
-            <a:off x="1323828" y="5623474"/>
-            <a:ext cx="3326422" cy="597600"/>
-          </a:xfrm>
-          <a:prstGeom prst="roundRect">
-            <a:avLst/>
-          </a:prstGeom>
-          <a:solidFill>
-            <a:srgbClr val="F8D14C"/>
-          </a:solidFill>
-          <a:ln>
-            <a:solidFill>
-              <a:srgbClr val="C5DA00"/>
-            </a:solidFill>
-          </a:ln>
-        </p:spPr>
-        <p:style>
-          <a:lnRef idx="2">
-            <a:schemeClr val="accent1">
-              <a:shade val="50000"/>
-            </a:schemeClr>
-          </a:lnRef>
-          <a:fillRef idx="1">
-            <a:schemeClr val="accent1"/>
-          </a:fillRef>
-          <a:effectRef idx="0">
-            <a:schemeClr val="accent1"/>
-          </a:effectRef>
-          <a:fontRef idx="minor">
-            <a:schemeClr val="lt1"/>
-          </a:fontRef>
-        </p:style>
-        <p:txBody>
-          <a:bodyPr rot="0" spcFirstLastPara="0" vertOverflow="overflow" horzOverflow="overflow" vert="horz" wrap="square" lIns="91440" tIns="45720" rIns="91440" bIns="45720" numCol="1" spcCol="0" rtlCol="0" fromWordArt="0" anchor="ctr" anchorCtr="0" forceAA="0" compatLnSpc="1">
-            <a:prstTxWarp prst="textNoShape">
-              <a:avLst/>
-            </a:prstTxWarp>
-            <a:noAutofit/>
-          </a:bodyPr>
-          <a:lstStyle/>
-          <a:p>
-            <a:pPr algn="ctr">
-              <a:lnSpc>
-                <a:spcPct val="97000"/>
-              </a:lnSpc>
-            </a:pPr>
-            <a:r>
-              <a:rPr lang="en-US" dirty="0">
-                <a:solidFill>
-                  <a:schemeClr val="bg1"/>
-                </a:solidFill>
-              </a:rPr>
-              <a:t>Protein quantification</a:t>
-            </a:r>
-          </a:p>
-        </p:txBody>
-      </p:sp>
-      <p:sp>
-        <p:nvSpPr>
-          <p:cNvPr id="16" name="TextBox 15">
-            <a:extLst>
-              <a:ext uri="{FF2B5EF4-FFF2-40B4-BE49-F238E27FC236}">
-                <a16:creationId xmlns:a16="http://schemas.microsoft.com/office/drawing/2014/main" id="{088162B1-C00C-4088-BB6E-14FF684603B9}"/>
-              </a:ext>
-            </a:extLst>
-          </p:cNvPr>
-          <p:cNvSpPr txBox="1"/>
-          <p:nvPr/>
-        </p:nvSpPr>
-        <p:spPr>
-          <a:xfrm>
-            <a:off x="2027409" y="321730"/>
-            <a:ext cx="2493694" cy="835870"/>
-          </a:xfrm>
-          <a:prstGeom prst="rect">
-            <a:avLst/>
-          </a:prstGeom>
-          <a:noFill/>
-        </p:spPr>
-        <p:txBody>
-          <a:bodyPr wrap="square" lIns="0" tIns="0" rIns="0" bIns="0" rtlCol="0">
-            <a:spAutoFit/>
-          </a:bodyPr>
-          <a:lstStyle/>
-          <a:p>
-            <a:pPr algn="ctr">
-              <a:lnSpc>
-                <a:spcPct val="97000"/>
-              </a:lnSpc>
-            </a:pPr>
-            <a:r>
-              <a:rPr lang="en-US" sz="2800" dirty="0"/>
-              <a:t>Computational analysis</a:t>
-            </a:r>
-          </a:p>
-        </p:txBody>
-      </p:sp>
-      <p:pic>
-        <p:nvPicPr>
-          <p:cNvPr id="3" name="Picture 2">
-            <a:extLst>
-              <a:ext uri="{FF2B5EF4-FFF2-40B4-BE49-F238E27FC236}">
-                <a16:creationId xmlns:a16="http://schemas.microsoft.com/office/drawing/2014/main" id="{25B9F1B5-9A8A-4DDE-B062-BAA938467267}"/>
-              </a:ext>
-            </a:extLst>
-          </p:cNvPr>
-          <p:cNvPicPr>
-            <a:picLocks noChangeAspect="1"/>
-          </p:cNvPicPr>
-          <p:nvPr/>
-        </p:nvPicPr>
-        <p:blipFill>
-          <a:blip r:embed="rId2">
-            <a:extLst>
-              <a:ext uri="{28A0092B-C50C-407E-A947-70E740481C1C}">
-                <a14:useLocalDpi xmlns:a14="http://schemas.microsoft.com/office/drawing/2010/main" val="0"/>
-              </a:ext>
-            </a:extLst>
-          </a:blip>
-          <a:stretch>
-            <a:fillRect/>
-          </a:stretch>
-        </p:blipFill>
-        <p:spPr>
-          <a:xfrm>
-            <a:off x="5239109" y="1508878"/>
-            <a:ext cx="1141704" cy="617643"/>
-          </a:xfrm>
-          <a:prstGeom prst="rect">
-            <a:avLst/>
-          </a:prstGeom>
-        </p:spPr>
-      </p:pic>
-      <p:pic>
-        <p:nvPicPr>
-          <p:cNvPr id="9" name="Picture 8">
-            <a:extLst>
-              <a:ext uri="{FF2B5EF4-FFF2-40B4-BE49-F238E27FC236}">
-                <a16:creationId xmlns:a16="http://schemas.microsoft.com/office/drawing/2014/main" id="{20928385-BB96-481A-8DDE-4F1A04F1E8E8}"/>
-              </a:ext>
-            </a:extLst>
-          </p:cNvPr>
-          <p:cNvPicPr>
-            <a:picLocks noChangeAspect="1"/>
-          </p:cNvPicPr>
-          <p:nvPr/>
-        </p:nvPicPr>
-        <p:blipFill rotWithShape="1">
-          <a:blip r:embed="rId3"/>
-          <a:srcRect t="56025" r="13119"/>
-          <a:stretch/>
-        </p:blipFill>
-        <p:spPr>
-          <a:xfrm>
-            <a:off x="5239109" y="2188456"/>
-            <a:ext cx="3781866" cy="540337"/>
-          </a:xfrm>
-          <a:prstGeom prst="rect">
-            <a:avLst/>
-          </a:prstGeom>
-        </p:spPr>
-      </p:pic>
-      <p:pic>
-        <p:nvPicPr>
-          <p:cNvPr id="20" name="Picture 19">
-            <a:extLst>
-              <a:ext uri="{FF2B5EF4-FFF2-40B4-BE49-F238E27FC236}">
-                <a16:creationId xmlns:a16="http://schemas.microsoft.com/office/drawing/2014/main" id="{17411C78-27F9-4542-957C-190416E727FA}"/>
-              </a:ext>
-            </a:extLst>
-          </p:cNvPr>
-          <p:cNvPicPr>
-            <a:picLocks noChangeAspect="1"/>
-          </p:cNvPicPr>
-          <p:nvPr/>
-        </p:nvPicPr>
-        <p:blipFill rotWithShape="1">
-          <a:blip r:embed="rId4" cstate="print">
-            <a:extLst>
-              <a:ext uri="{28A0092B-C50C-407E-A947-70E740481C1C}">
-                <a14:useLocalDpi xmlns:a14="http://schemas.microsoft.com/office/drawing/2010/main" val="0"/>
-              </a:ext>
-            </a:extLst>
-          </a:blip>
-          <a:srcRect t="22071" b="27544"/>
-          <a:stretch/>
-        </p:blipFill>
-        <p:spPr>
-          <a:xfrm>
-            <a:off x="5239109" y="2890298"/>
-            <a:ext cx="2286000" cy="719879"/>
-          </a:xfrm>
-          <a:prstGeom prst="rect">
-            <a:avLst/>
-          </a:prstGeom>
-        </p:spPr>
-      </p:pic>
-      <p:pic>
-        <p:nvPicPr>
-          <p:cNvPr id="24" name="Picture 23">
-            <a:extLst>
-              <a:ext uri="{FF2B5EF4-FFF2-40B4-BE49-F238E27FC236}">
-                <a16:creationId xmlns:a16="http://schemas.microsoft.com/office/drawing/2014/main" id="{B35F4332-EFD7-4C8D-800E-B49A49184AC7}"/>
-              </a:ext>
-            </a:extLst>
-          </p:cNvPr>
-          <p:cNvPicPr>
-            <a:picLocks noChangeAspect="1"/>
-          </p:cNvPicPr>
-          <p:nvPr/>
-        </p:nvPicPr>
-        <p:blipFill>
-          <a:blip r:embed="rId5">
-            <a:extLst>
-              <a:ext uri="{28A0092B-C50C-407E-A947-70E740481C1C}">
-                <a14:useLocalDpi xmlns:a14="http://schemas.microsoft.com/office/drawing/2010/main" val="0"/>
-              </a:ext>
-            </a:extLst>
-          </a:blip>
-          <a:stretch>
-            <a:fillRect/>
-          </a:stretch>
-        </p:blipFill>
-        <p:spPr>
-          <a:xfrm>
-            <a:off x="5239109" y="4072365"/>
-            <a:ext cx="2286000" cy="1428750"/>
-          </a:xfrm>
-          <a:prstGeom prst="rect">
-            <a:avLst/>
-          </a:prstGeom>
-        </p:spPr>
-      </p:pic>
-      <p:grpSp>
-        <p:nvGrpSpPr>
-          <p:cNvPr id="33" name="Group 32">
-            <a:extLst>
-              <a:ext uri="{FF2B5EF4-FFF2-40B4-BE49-F238E27FC236}">
-                <a16:creationId xmlns:a16="http://schemas.microsoft.com/office/drawing/2014/main" id="{8DFB9C0D-4DE1-4A2E-8B3B-02EEBCFF3D2D}"/>
+                <a16:creationId xmlns:a16="http://schemas.microsoft.com/office/drawing/2014/main" id="{6AD98214-34FE-41B8-A9A5-4A24BB803AF1}"/>
               </a:ext>
             </a:extLst>
           </p:cNvPr>
@@ -16572,18 +15777,835 @@
         </p:nvGrpSpPr>
         <p:grpSpPr>
           <a:xfrm>
-            <a:off x="5239109" y="5384340"/>
-            <a:ext cx="2842712" cy="1190376"/>
-            <a:chOff x="5192451" y="5439428"/>
-            <a:chExt cx="2579782" cy="1080275"/>
+            <a:off x="408989" y="90312"/>
+            <a:ext cx="11783011" cy="6767688"/>
+            <a:chOff x="408989" y="90312"/>
+            <a:chExt cx="11783011" cy="6767688"/>
           </a:xfrm>
         </p:grpSpPr>
+        <p:sp>
+          <p:nvSpPr>
+            <p:cNvPr id="30" name="Rectangle 29">
+              <a:extLst>
+                <a:ext uri="{FF2B5EF4-FFF2-40B4-BE49-F238E27FC236}">
+                  <a16:creationId xmlns:a16="http://schemas.microsoft.com/office/drawing/2014/main" id="{45DEE638-CC0F-4883-9AA0-8B23B90D1987}"/>
+                </a:ext>
+              </a:extLst>
+            </p:cNvPr>
+            <p:cNvSpPr/>
+            <p:nvPr/>
+          </p:nvSpPr>
+          <p:spPr>
+            <a:xfrm>
+              <a:off x="10136650" y="6104932"/>
+              <a:ext cx="2055350" cy="753068"/>
+            </a:xfrm>
+            <a:prstGeom prst="rect">
+              <a:avLst/>
+            </a:prstGeom>
+            <a:solidFill>
+              <a:schemeClr val="bg1"/>
+            </a:solidFill>
+            <a:ln>
+              <a:noFill/>
+            </a:ln>
+          </p:spPr>
+          <p:style>
+            <a:lnRef idx="2">
+              <a:schemeClr val="accent1">
+                <a:shade val="50000"/>
+              </a:schemeClr>
+            </a:lnRef>
+            <a:fillRef idx="1">
+              <a:schemeClr val="accent1"/>
+            </a:fillRef>
+            <a:effectRef idx="0">
+              <a:schemeClr val="accent1"/>
+            </a:effectRef>
+            <a:fontRef idx="minor">
+              <a:schemeClr val="lt1"/>
+            </a:fontRef>
+          </p:style>
+          <p:txBody>
+            <a:bodyPr rot="0" spcFirstLastPara="0" vertOverflow="overflow" horzOverflow="overflow" vert="horz" wrap="square" lIns="91440" tIns="45720" rIns="91440" bIns="45720" numCol="1" spcCol="0" rtlCol="0" fromWordArt="0" anchor="ctr" anchorCtr="0" forceAA="0" compatLnSpc="1">
+              <a:prstTxWarp prst="textNoShape">
+                <a:avLst/>
+              </a:prstTxWarp>
+              <a:noAutofit/>
+            </a:bodyPr>
+            <a:lstStyle/>
+            <a:p>
+              <a:pPr algn="ctr">
+                <a:lnSpc>
+                  <a:spcPct val="97000"/>
+                </a:lnSpc>
+              </a:pPr>
+              <a:endParaRPr lang="en-US" dirty="0" err="1">
+                <a:solidFill>
+                  <a:schemeClr val="tx1"/>
+                </a:solidFill>
+              </a:endParaRPr>
+            </a:p>
+          </p:txBody>
+        </p:sp>
+        <p:sp>
+          <p:nvSpPr>
+            <p:cNvPr id="15" name="Arrow: Bent 14">
+              <a:extLst>
+                <a:ext uri="{FF2B5EF4-FFF2-40B4-BE49-F238E27FC236}">
+                  <a16:creationId xmlns:a16="http://schemas.microsoft.com/office/drawing/2014/main" id="{D96ED481-D610-4749-8555-15C9FD366159}"/>
+                </a:ext>
+              </a:extLst>
+            </p:cNvPr>
+            <p:cNvSpPr/>
+            <p:nvPr/>
+          </p:nvSpPr>
+          <p:spPr>
+            <a:xfrm rot="5400000">
+              <a:off x="-227193" y="2352682"/>
+              <a:ext cx="4392462" cy="2171662"/>
+            </a:xfrm>
+            <a:prstGeom prst="bentArrow">
+              <a:avLst>
+                <a:gd name="adj1" fmla="val 10277"/>
+                <a:gd name="adj2" fmla="val 9038"/>
+                <a:gd name="adj3" fmla="val 9444"/>
+                <a:gd name="adj4" fmla="val 43750"/>
+              </a:avLst>
+            </a:prstGeom>
+            <a:solidFill>
+              <a:srgbClr val="2C9FD1"/>
+            </a:solidFill>
+            <a:ln>
+              <a:noFill/>
+            </a:ln>
+          </p:spPr>
+          <p:style>
+            <a:lnRef idx="2">
+              <a:schemeClr val="accent1">
+                <a:shade val="50000"/>
+              </a:schemeClr>
+            </a:lnRef>
+            <a:fillRef idx="1">
+              <a:schemeClr val="accent1"/>
+            </a:fillRef>
+            <a:effectRef idx="0">
+              <a:schemeClr val="accent1"/>
+            </a:effectRef>
+            <a:fontRef idx="minor">
+              <a:schemeClr val="lt1"/>
+            </a:fontRef>
+          </p:style>
+          <p:txBody>
+            <a:bodyPr rot="0" spcFirstLastPara="0" vertOverflow="overflow" horzOverflow="overflow" vert="horz" wrap="square" lIns="91440" tIns="45720" rIns="91440" bIns="45720" numCol="1" spcCol="0" rtlCol="0" fromWordArt="0" anchor="ctr" anchorCtr="0" forceAA="0" compatLnSpc="1">
+              <a:prstTxWarp prst="textNoShape">
+                <a:avLst/>
+              </a:prstTxWarp>
+              <a:noAutofit/>
+            </a:bodyPr>
+            <a:lstStyle/>
+            <a:p>
+              <a:pPr algn="ctr">
+                <a:lnSpc>
+                  <a:spcPct val="97000"/>
+                </a:lnSpc>
+              </a:pPr>
+              <a:endParaRPr lang="en-US" dirty="0" err="1">
+                <a:solidFill>
+                  <a:schemeClr val="tx1"/>
+                </a:solidFill>
+              </a:endParaRPr>
+            </a:p>
+          </p:txBody>
+        </p:sp>
+        <p:sp>
+          <p:nvSpPr>
+            <p:cNvPr id="28" name="Rectangle 27">
+              <a:extLst>
+                <a:ext uri="{FF2B5EF4-FFF2-40B4-BE49-F238E27FC236}">
+                  <a16:creationId xmlns:a16="http://schemas.microsoft.com/office/drawing/2014/main" id="{7F692F3F-D527-491E-B480-DD55D8A4F299}"/>
+                </a:ext>
+              </a:extLst>
+            </p:cNvPr>
+            <p:cNvSpPr/>
+            <p:nvPr/>
+          </p:nvSpPr>
+          <p:spPr>
+            <a:xfrm>
+              <a:off x="408989" y="90312"/>
+              <a:ext cx="10309168" cy="6377650"/>
+            </a:xfrm>
+            <a:prstGeom prst="rect">
+              <a:avLst/>
+            </a:prstGeom>
+            <a:noFill/>
+            <a:ln w="57150">
+              <a:solidFill>
+                <a:schemeClr val="tx1"/>
+              </a:solidFill>
+            </a:ln>
+          </p:spPr>
+          <p:style>
+            <a:lnRef idx="2">
+              <a:schemeClr val="accent1">
+                <a:shade val="50000"/>
+              </a:schemeClr>
+            </a:lnRef>
+            <a:fillRef idx="1">
+              <a:schemeClr val="accent1"/>
+            </a:fillRef>
+            <a:effectRef idx="0">
+              <a:schemeClr val="accent1"/>
+            </a:effectRef>
+            <a:fontRef idx="minor">
+              <a:schemeClr val="lt1"/>
+            </a:fontRef>
+          </p:style>
+          <p:txBody>
+            <a:bodyPr rot="0" spcFirstLastPara="0" vertOverflow="overflow" horzOverflow="overflow" vert="horz" wrap="square" lIns="91440" tIns="45720" rIns="91440" bIns="45720" numCol="1" spcCol="0" rtlCol="0" fromWordArt="0" anchor="ctr" anchorCtr="0" forceAA="0" compatLnSpc="1">
+              <a:prstTxWarp prst="textNoShape">
+                <a:avLst/>
+              </a:prstTxWarp>
+              <a:noAutofit/>
+            </a:bodyPr>
+            <a:lstStyle/>
+            <a:p>
+              <a:pPr algn="ctr">
+                <a:lnSpc>
+                  <a:spcPct val="97000"/>
+                </a:lnSpc>
+              </a:pPr>
+              <a:endParaRPr lang="en-US" dirty="0" err="1">
+                <a:solidFill>
+                  <a:schemeClr val="tx1"/>
+                </a:solidFill>
+              </a:endParaRPr>
+            </a:p>
+          </p:txBody>
+        </p:sp>
+        <p:sp>
+          <p:nvSpPr>
+            <p:cNvPr id="7" name="Rectangle: Rounded Corners 6">
+              <a:extLst>
+                <a:ext uri="{FF2B5EF4-FFF2-40B4-BE49-F238E27FC236}">
+                  <a16:creationId xmlns:a16="http://schemas.microsoft.com/office/drawing/2014/main" id="{78D5A450-F67B-496E-8B00-2D9F554E6220}"/>
+                </a:ext>
+              </a:extLst>
+            </p:cNvPr>
+            <p:cNvSpPr/>
+            <p:nvPr/>
+          </p:nvSpPr>
+          <p:spPr>
+            <a:xfrm>
+              <a:off x="736959" y="808218"/>
+              <a:ext cx="1345223" cy="1099039"/>
+            </a:xfrm>
+            <a:prstGeom prst="roundRect">
+              <a:avLst/>
+            </a:prstGeom>
+            <a:solidFill>
+              <a:srgbClr val="002060"/>
+            </a:solidFill>
+            <a:ln>
+              <a:noFill/>
+            </a:ln>
+          </p:spPr>
+          <p:style>
+            <a:lnRef idx="2">
+              <a:schemeClr val="accent1">
+                <a:shade val="50000"/>
+              </a:schemeClr>
+            </a:lnRef>
+            <a:fillRef idx="1">
+              <a:schemeClr val="accent1"/>
+            </a:fillRef>
+            <a:effectRef idx="0">
+              <a:schemeClr val="accent1"/>
+            </a:effectRef>
+            <a:fontRef idx="minor">
+              <a:schemeClr val="lt1"/>
+            </a:fontRef>
+          </p:style>
+          <p:txBody>
+            <a:bodyPr rot="0" spcFirstLastPara="0" vertOverflow="overflow" horzOverflow="overflow" vert="horz" wrap="square" lIns="91440" tIns="45720" rIns="91440" bIns="45720" numCol="1" spcCol="0" rtlCol="0" fromWordArt="0" anchor="ctr" anchorCtr="0" forceAA="0" compatLnSpc="1">
+              <a:prstTxWarp prst="textNoShape">
+                <a:avLst/>
+              </a:prstTxWarp>
+              <a:noAutofit/>
+            </a:bodyPr>
+            <a:lstStyle/>
+            <a:p>
+              <a:pPr algn="ctr">
+                <a:lnSpc>
+                  <a:spcPct val="97000"/>
+                </a:lnSpc>
+              </a:pPr>
+              <a:r>
+                <a:rPr lang="en-US" dirty="0">
+                  <a:solidFill>
+                    <a:schemeClr val="bg1"/>
+                  </a:solidFill>
+                </a:rPr>
+                <a:t>.RAW files</a:t>
+              </a:r>
+            </a:p>
+          </p:txBody>
+        </p:sp>
+        <p:sp>
+          <p:nvSpPr>
+            <p:cNvPr id="10" name="Rectangle: Rounded Corners 9">
+              <a:extLst>
+                <a:ext uri="{FF2B5EF4-FFF2-40B4-BE49-F238E27FC236}">
+                  <a16:creationId xmlns:a16="http://schemas.microsoft.com/office/drawing/2014/main" id="{C1965BF3-4993-4D9D-A44F-C9EF5ECBD135}"/>
+                </a:ext>
+              </a:extLst>
+            </p:cNvPr>
+            <p:cNvSpPr/>
+            <p:nvPr/>
+          </p:nvSpPr>
+          <p:spPr>
+            <a:xfrm>
+              <a:off x="1323828" y="2047935"/>
+              <a:ext cx="3326422" cy="597600"/>
+            </a:xfrm>
+            <a:prstGeom prst="roundRect">
+              <a:avLst/>
+            </a:prstGeom>
+            <a:solidFill>
+              <a:srgbClr val="F8D14C"/>
+            </a:solidFill>
+            <a:ln>
+              <a:solidFill>
+                <a:srgbClr val="C5DA00"/>
+              </a:solidFill>
+            </a:ln>
+          </p:spPr>
+          <p:style>
+            <a:lnRef idx="2">
+              <a:schemeClr val="accent1">
+                <a:shade val="50000"/>
+              </a:schemeClr>
+            </a:lnRef>
+            <a:fillRef idx="1">
+              <a:schemeClr val="accent1"/>
+            </a:fillRef>
+            <a:effectRef idx="0">
+              <a:schemeClr val="accent1"/>
+            </a:effectRef>
+            <a:fontRef idx="minor">
+              <a:schemeClr val="lt1"/>
+            </a:fontRef>
+          </p:style>
+          <p:txBody>
+            <a:bodyPr rot="0" spcFirstLastPara="0" vertOverflow="overflow" horzOverflow="overflow" vert="horz" wrap="square" lIns="91440" tIns="45720" rIns="91440" bIns="45720" numCol="1" spcCol="0" rtlCol="0" fromWordArt="0" anchor="ctr" anchorCtr="0" forceAA="0" compatLnSpc="1">
+              <a:prstTxWarp prst="textNoShape">
+                <a:avLst/>
+              </a:prstTxWarp>
+              <a:noAutofit/>
+            </a:bodyPr>
+            <a:lstStyle/>
+            <a:p>
+              <a:pPr algn="ctr">
+                <a:lnSpc>
+                  <a:spcPct val="97000"/>
+                </a:lnSpc>
+              </a:pPr>
+              <a:r>
+                <a:rPr lang="en-US" dirty="0">
+                  <a:solidFill>
+                    <a:schemeClr val="bg1"/>
+                  </a:solidFill>
+                </a:rPr>
+                <a:t>Open format conversion (MGF)</a:t>
+              </a:r>
+            </a:p>
+          </p:txBody>
+        </p:sp>
+        <p:sp>
+          <p:nvSpPr>
+            <p:cNvPr id="11" name="Rectangle: Rounded Corners 10">
+              <a:extLst>
+                <a:ext uri="{FF2B5EF4-FFF2-40B4-BE49-F238E27FC236}">
+                  <a16:creationId xmlns:a16="http://schemas.microsoft.com/office/drawing/2014/main" id="{B756DF75-B295-4063-B804-7078E3CA2E31}"/>
+                </a:ext>
+              </a:extLst>
+            </p:cNvPr>
+            <p:cNvSpPr/>
+            <p:nvPr/>
+          </p:nvSpPr>
+          <p:spPr>
+            <a:xfrm>
+              <a:off x="1323828" y="2960870"/>
+              <a:ext cx="3326422" cy="597600"/>
+            </a:xfrm>
+            <a:prstGeom prst="roundRect">
+              <a:avLst/>
+            </a:prstGeom>
+            <a:solidFill>
+              <a:srgbClr val="F8D14C"/>
+            </a:solidFill>
+            <a:ln>
+              <a:solidFill>
+                <a:srgbClr val="C5DA00"/>
+              </a:solidFill>
+            </a:ln>
+          </p:spPr>
+          <p:style>
+            <a:lnRef idx="2">
+              <a:schemeClr val="accent1">
+                <a:shade val="50000"/>
+              </a:schemeClr>
+            </a:lnRef>
+            <a:fillRef idx="1">
+              <a:schemeClr val="accent1"/>
+            </a:fillRef>
+            <a:effectRef idx="0">
+              <a:schemeClr val="accent1"/>
+            </a:effectRef>
+            <a:fontRef idx="minor">
+              <a:schemeClr val="lt1"/>
+            </a:fontRef>
+          </p:style>
+          <p:txBody>
+            <a:bodyPr rot="0" spcFirstLastPara="0" vertOverflow="overflow" horzOverflow="overflow" vert="horz" wrap="square" lIns="91440" tIns="45720" rIns="91440" bIns="45720" numCol="1" spcCol="0" rtlCol="0" fromWordArt="0" anchor="ctr" anchorCtr="0" forceAA="0" compatLnSpc="1">
+              <a:prstTxWarp prst="textNoShape">
+                <a:avLst/>
+              </a:prstTxWarp>
+              <a:noAutofit/>
+            </a:bodyPr>
+            <a:lstStyle/>
+            <a:p>
+              <a:pPr algn="ctr">
+                <a:lnSpc>
+                  <a:spcPct val="97000"/>
+                </a:lnSpc>
+              </a:pPr>
+              <a:r>
+                <a:rPr lang="en-US" dirty="0">
+                  <a:solidFill>
+                    <a:schemeClr val="bg1"/>
+                  </a:solidFill>
+                </a:rPr>
+                <a:t>Peptide to Spectrum matching (PSM)</a:t>
+              </a:r>
+            </a:p>
+          </p:txBody>
+        </p:sp>
+        <p:sp>
+          <p:nvSpPr>
+            <p:cNvPr id="12" name="Rectangle: Rounded Corners 11">
+              <a:extLst>
+                <a:ext uri="{FF2B5EF4-FFF2-40B4-BE49-F238E27FC236}">
+                  <a16:creationId xmlns:a16="http://schemas.microsoft.com/office/drawing/2014/main" id="{67DD93A6-7BEB-48FA-97C4-48A25770CB6A}"/>
+                </a:ext>
+              </a:extLst>
+            </p:cNvPr>
+            <p:cNvSpPr/>
+            <p:nvPr/>
+          </p:nvSpPr>
+          <p:spPr>
+            <a:xfrm>
+              <a:off x="1323828" y="3873805"/>
+              <a:ext cx="3326422" cy="597600"/>
+            </a:xfrm>
+            <a:prstGeom prst="roundRect">
+              <a:avLst/>
+            </a:prstGeom>
+            <a:solidFill>
+              <a:srgbClr val="F8D14C"/>
+            </a:solidFill>
+            <a:ln>
+              <a:solidFill>
+                <a:srgbClr val="C5DA00"/>
+              </a:solidFill>
+            </a:ln>
+          </p:spPr>
+          <p:style>
+            <a:lnRef idx="2">
+              <a:schemeClr val="accent1">
+                <a:shade val="50000"/>
+              </a:schemeClr>
+            </a:lnRef>
+            <a:fillRef idx="1">
+              <a:schemeClr val="accent1"/>
+            </a:fillRef>
+            <a:effectRef idx="0">
+              <a:schemeClr val="accent1"/>
+            </a:effectRef>
+            <a:fontRef idx="minor">
+              <a:schemeClr val="lt1"/>
+            </a:fontRef>
+          </p:style>
+          <p:txBody>
+            <a:bodyPr rot="0" spcFirstLastPara="0" vertOverflow="overflow" horzOverflow="overflow" vert="horz" wrap="square" lIns="91440" tIns="45720" rIns="91440" bIns="45720" numCol="1" spcCol="0" rtlCol="0" fromWordArt="0" anchor="ctr" anchorCtr="0" forceAA="0" compatLnSpc="1">
+              <a:prstTxWarp prst="textNoShape">
+                <a:avLst/>
+              </a:prstTxWarp>
+              <a:noAutofit/>
+            </a:bodyPr>
+            <a:lstStyle/>
+            <a:p>
+              <a:pPr algn="ctr">
+                <a:lnSpc>
+                  <a:spcPct val="97000"/>
+                </a:lnSpc>
+              </a:pPr>
+              <a:r>
+                <a:rPr lang="en-US" dirty="0">
+                  <a:solidFill>
+                    <a:schemeClr val="bg1"/>
+                  </a:solidFill>
+                </a:rPr>
+                <a:t>QC, Validation and Inference</a:t>
+              </a:r>
+            </a:p>
+          </p:txBody>
+        </p:sp>
+        <p:sp>
+          <p:nvSpPr>
+            <p:cNvPr id="13" name="Rectangle: Rounded Corners 12">
+              <a:extLst>
+                <a:ext uri="{FF2B5EF4-FFF2-40B4-BE49-F238E27FC236}">
+                  <a16:creationId xmlns:a16="http://schemas.microsoft.com/office/drawing/2014/main" id="{7F832371-63C7-474E-8E2C-0878EBB76199}"/>
+                </a:ext>
+              </a:extLst>
+            </p:cNvPr>
+            <p:cNvSpPr/>
+            <p:nvPr/>
+          </p:nvSpPr>
+          <p:spPr>
+            <a:xfrm>
+              <a:off x="1323828" y="4786740"/>
+              <a:ext cx="3326422" cy="597600"/>
+            </a:xfrm>
+            <a:prstGeom prst="roundRect">
+              <a:avLst/>
+            </a:prstGeom>
+            <a:solidFill>
+              <a:srgbClr val="F8D14C"/>
+            </a:solidFill>
+            <a:ln>
+              <a:solidFill>
+                <a:srgbClr val="C5DA00"/>
+              </a:solidFill>
+            </a:ln>
+          </p:spPr>
+          <p:style>
+            <a:lnRef idx="2">
+              <a:schemeClr val="accent1">
+                <a:shade val="50000"/>
+              </a:schemeClr>
+            </a:lnRef>
+            <a:fillRef idx="1">
+              <a:schemeClr val="accent1"/>
+            </a:fillRef>
+            <a:effectRef idx="0">
+              <a:schemeClr val="accent1"/>
+            </a:effectRef>
+            <a:fontRef idx="minor">
+              <a:schemeClr val="lt1"/>
+            </a:fontRef>
+          </p:style>
+          <p:txBody>
+            <a:bodyPr rot="0" spcFirstLastPara="0" vertOverflow="overflow" horzOverflow="overflow" vert="horz" wrap="square" lIns="91440" tIns="45720" rIns="91440" bIns="45720" numCol="1" spcCol="0" rtlCol="0" fromWordArt="0" anchor="ctr" anchorCtr="0" forceAA="0" compatLnSpc="1">
+              <a:prstTxWarp prst="textNoShape">
+                <a:avLst/>
+              </a:prstTxWarp>
+              <a:noAutofit/>
+            </a:bodyPr>
+            <a:lstStyle/>
+            <a:p>
+              <a:pPr algn="ctr">
+                <a:lnSpc>
+                  <a:spcPct val="97000"/>
+                </a:lnSpc>
+              </a:pPr>
+              <a:r>
+                <a:rPr lang="en-US" dirty="0">
+                  <a:solidFill>
+                    <a:schemeClr val="bg1"/>
+                  </a:solidFill>
+                </a:rPr>
+                <a:t>Feature extraction</a:t>
+              </a:r>
+            </a:p>
+          </p:txBody>
+        </p:sp>
+        <p:sp>
+          <p:nvSpPr>
+            <p:cNvPr id="14" name="Rectangle: Rounded Corners 13">
+              <a:extLst>
+                <a:ext uri="{FF2B5EF4-FFF2-40B4-BE49-F238E27FC236}">
+                  <a16:creationId xmlns:a16="http://schemas.microsoft.com/office/drawing/2014/main" id="{A18AB81A-5908-4C89-8838-5940125BC5EB}"/>
+                </a:ext>
+              </a:extLst>
+            </p:cNvPr>
+            <p:cNvSpPr/>
+            <p:nvPr/>
+          </p:nvSpPr>
+          <p:spPr>
+            <a:xfrm>
+              <a:off x="1323828" y="5623474"/>
+              <a:ext cx="3326422" cy="597600"/>
+            </a:xfrm>
+            <a:prstGeom prst="roundRect">
+              <a:avLst/>
+            </a:prstGeom>
+            <a:solidFill>
+              <a:srgbClr val="F8D14C"/>
+            </a:solidFill>
+            <a:ln>
+              <a:solidFill>
+                <a:srgbClr val="C5DA00"/>
+              </a:solidFill>
+            </a:ln>
+          </p:spPr>
+          <p:style>
+            <a:lnRef idx="2">
+              <a:schemeClr val="accent1">
+                <a:shade val="50000"/>
+              </a:schemeClr>
+            </a:lnRef>
+            <a:fillRef idx="1">
+              <a:schemeClr val="accent1"/>
+            </a:fillRef>
+            <a:effectRef idx="0">
+              <a:schemeClr val="accent1"/>
+            </a:effectRef>
+            <a:fontRef idx="minor">
+              <a:schemeClr val="lt1"/>
+            </a:fontRef>
+          </p:style>
+          <p:txBody>
+            <a:bodyPr rot="0" spcFirstLastPara="0" vertOverflow="overflow" horzOverflow="overflow" vert="horz" wrap="square" lIns="91440" tIns="45720" rIns="91440" bIns="45720" numCol="1" spcCol="0" rtlCol="0" fromWordArt="0" anchor="ctr" anchorCtr="0" forceAA="0" compatLnSpc="1">
+              <a:prstTxWarp prst="textNoShape">
+                <a:avLst/>
+              </a:prstTxWarp>
+              <a:noAutofit/>
+            </a:bodyPr>
+            <a:lstStyle/>
+            <a:p>
+              <a:pPr algn="ctr">
+                <a:lnSpc>
+                  <a:spcPct val="97000"/>
+                </a:lnSpc>
+              </a:pPr>
+              <a:r>
+                <a:rPr lang="en-US" dirty="0">
+                  <a:solidFill>
+                    <a:schemeClr val="bg1"/>
+                  </a:solidFill>
+                </a:rPr>
+                <a:t>Protein quantification</a:t>
+              </a:r>
+            </a:p>
+          </p:txBody>
+        </p:sp>
+        <p:sp>
+          <p:nvSpPr>
+            <p:cNvPr id="16" name="TextBox 15">
+              <a:extLst>
+                <a:ext uri="{FF2B5EF4-FFF2-40B4-BE49-F238E27FC236}">
+                  <a16:creationId xmlns:a16="http://schemas.microsoft.com/office/drawing/2014/main" id="{088162B1-C00C-4088-BB6E-14FF684603B9}"/>
+                </a:ext>
+              </a:extLst>
+            </p:cNvPr>
+            <p:cNvSpPr txBox="1"/>
+            <p:nvPr/>
+          </p:nvSpPr>
+          <p:spPr>
+            <a:xfrm>
+              <a:off x="2027409" y="321730"/>
+              <a:ext cx="2493694" cy="835870"/>
+            </a:xfrm>
+            <a:prstGeom prst="rect">
+              <a:avLst/>
+            </a:prstGeom>
+            <a:noFill/>
+          </p:spPr>
+          <p:txBody>
+            <a:bodyPr wrap="square" lIns="0" tIns="0" rIns="0" bIns="0" rtlCol="0">
+              <a:spAutoFit/>
+            </a:bodyPr>
+            <a:lstStyle/>
+            <a:p>
+              <a:pPr algn="ctr">
+                <a:lnSpc>
+                  <a:spcPct val="97000"/>
+                </a:lnSpc>
+              </a:pPr>
+              <a:r>
+                <a:rPr lang="en-US" sz="2800" dirty="0"/>
+                <a:t>Computational analysis</a:t>
+              </a:r>
+            </a:p>
+          </p:txBody>
+        </p:sp>
+        <p:grpSp>
+          <p:nvGrpSpPr>
+            <p:cNvPr id="19" name="Group 18">
+              <a:extLst>
+                <a:ext uri="{FF2B5EF4-FFF2-40B4-BE49-F238E27FC236}">
+                  <a16:creationId xmlns:a16="http://schemas.microsoft.com/office/drawing/2014/main" id="{F15363A8-0E0B-4E88-8D7A-565DBA99DA80}"/>
+                </a:ext>
+              </a:extLst>
+            </p:cNvPr>
+            <p:cNvGrpSpPr/>
+            <p:nvPr/>
+          </p:nvGrpSpPr>
+          <p:grpSpPr>
+            <a:xfrm>
+              <a:off x="1044690" y="1908408"/>
+              <a:ext cx="279137" cy="3128736"/>
+              <a:chOff x="6519515" y="1938477"/>
+              <a:chExt cx="279138" cy="2292002"/>
+            </a:xfrm>
+          </p:grpSpPr>
+          <p:cxnSp>
+            <p:nvCxnSpPr>
+              <p:cNvPr id="21" name="Straight Arrow Connector 20">
+                <a:extLst>
+                  <a:ext uri="{FF2B5EF4-FFF2-40B4-BE49-F238E27FC236}">
+                    <a16:creationId xmlns:a16="http://schemas.microsoft.com/office/drawing/2014/main" id="{EC146FA1-E058-4024-982F-05942913781F}"/>
+                  </a:ext>
+                </a:extLst>
+              </p:cNvPr>
+              <p:cNvCxnSpPr>
+                <a:cxnSpLocks/>
+              </p:cNvCxnSpPr>
+              <p:nvPr/>
+            </p:nvCxnSpPr>
+            <p:spPr>
+              <a:xfrm>
+                <a:off x="6519515" y="4230479"/>
+                <a:ext cx="279138" cy="0"/>
+              </a:xfrm>
+              <a:prstGeom prst="straightConnector1">
+                <a:avLst/>
+              </a:prstGeom>
+              <a:ln w="28575">
+                <a:solidFill>
+                  <a:srgbClr val="2D0028"/>
+                </a:solidFill>
+                <a:prstDash val="sysDash"/>
+                <a:tailEnd type="triangle"/>
+              </a:ln>
+            </p:spPr>
+            <p:style>
+              <a:lnRef idx="1">
+                <a:schemeClr val="accent1"/>
+              </a:lnRef>
+              <a:fillRef idx="0">
+                <a:schemeClr val="accent1"/>
+              </a:fillRef>
+              <a:effectRef idx="0">
+                <a:schemeClr val="accent1"/>
+              </a:effectRef>
+              <a:fontRef idx="minor">
+                <a:schemeClr val="tx1"/>
+              </a:fontRef>
+            </p:style>
+          </p:cxnSp>
+          <p:cxnSp>
+            <p:nvCxnSpPr>
+              <p:cNvPr id="22" name="Straight Connector 21">
+                <a:extLst>
+                  <a:ext uri="{FF2B5EF4-FFF2-40B4-BE49-F238E27FC236}">
+                    <a16:creationId xmlns:a16="http://schemas.microsoft.com/office/drawing/2014/main" id="{D45F8391-67AE-46FF-9F1F-483E5A512E90}"/>
+                  </a:ext>
+                </a:extLst>
+              </p:cNvPr>
+              <p:cNvCxnSpPr>
+                <a:cxnSpLocks/>
+              </p:cNvCxnSpPr>
+              <p:nvPr/>
+            </p:nvCxnSpPr>
+            <p:spPr>
+              <a:xfrm>
+                <a:off x="6519515" y="1938477"/>
+                <a:ext cx="0" cy="2292002"/>
+              </a:xfrm>
+              <a:prstGeom prst="line">
+                <a:avLst/>
+              </a:prstGeom>
+              <a:ln w="28575">
+                <a:solidFill>
+                  <a:srgbClr val="2D0028"/>
+                </a:solidFill>
+                <a:prstDash val="sysDash"/>
+              </a:ln>
+            </p:spPr>
+            <p:style>
+              <a:lnRef idx="1">
+                <a:schemeClr val="accent1"/>
+              </a:lnRef>
+              <a:fillRef idx="0">
+                <a:schemeClr val="accent1"/>
+              </a:fillRef>
+              <a:effectRef idx="0">
+                <a:schemeClr val="accent1"/>
+              </a:effectRef>
+              <a:fontRef idx="minor">
+                <a:schemeClr val="tx1"/>
+              </a:fontRef>
+            </p:style>
+          </p:cxnSp>
+        </p:grpSp>
+        <p:sp>
+          <p:nvSpPr>
+            <p:cNvPr id="2" name="TextBox 1">
+              <a:extLst>
+                <a:ext uri="{FF2B5EF4-FFF2-40B4-BE49-F238E27FC236}">
+                  <a16:creationId xmlns:a16="http://schemas.microsoft.com/office/drawing/2014/main" id="{2A23CFCE-2E25-460F-AC96-90603EB7C269}"/>
+                </a:ext>
+              </a:extLst>
+            </p:cNvPr>
+            <p:cNvSpPr txBox="1"/>
+            <p:nvPr/>
+          </p:nvSpPr>
+          <p:spPr>
+            <a:xfrm>
+              <a:off x="7293643" y="2047935"/>
+              <a:ext cx="3086100" cy="485518"/>
+            </a:xfrm>
+            <a:prstGeom prst="rect">
+              <a:avLst/>
+            </a:prstGeom>
+            <a:noFill/>
+          </p:spPr>
+          <p:txBody>
+            <a:bodyPr wrap="square" lIns="0" tIns="0" rIns="0" bIns="0" rtlCol="0">
+              <a:spAutoFit/>
+            </a:bodyPr>
+            <a:lstStyle/>
+            <a:p>
+              <a:pPr>
+                <a:lnSpc>
+                  <a:spcPct val="150000"/>
+                </a:lnSpc>
+              </a:pPr>
+              <a:r>
+                <a:rPr lang="en-US" sz="2400" dirty="0" err="1">
+                  <a:solidFill>
+                    <a:srgbClr val="2C9FD1"/>
+                  </a:solidFill>
+                </a:rPr>
+                <a:t>ThermoRawFileParser</a:t>
+              </a:r>
+              <a:endParaRPr lang="en-US" sz="2400" dirty="0">
+                <a:solidFill>
+                  <a:srgbClr val="2C9FD1"/>
+                </a:solidFill>
+              </a:endParaRPr>
+            </a:p>
+          </p:txBody>
+        </p:sp>
         <p:pic>
           <p:nvPicPr>
-            <p:cNvPr id="17" name="Picture 16">
+            <p:cNvPr id="5" name="Picture 4">
               <a:extLst>
                 <a:ext uri="{FF2B5EF4-FFF2-40B4-BE49-F238E27FC236}">
-                  <a16:creationId xmlns:a16="http://schemas.microsoft.com/office/drawing/2014/main" id="{587D4978-3953-43BF-84A0-D314AC9EDC98}"/>
+                  <a16:creationId xmlns:a16="http://schemas.microsoft.com/office/drawing/2014/main" id="{B33EA48A-E0F7-4DF1-94E6-EDE890F01CDC}"/>
                 </a:ext>
               </a:extLst>
             </p:cNvPr>
@@ -16593,15 +16615,21 @@
             <p:nvPr/>
           </p:nvPicPr>
           <p:blipFill>
-            <a:blip r:embed="rId6"/>
+            <a:blip r:embed="rId2" cstate="print">
+              <a:extLst>
+                <a:ext uri="{28A0092B-C50C-407E-A947-70E740481C1C}">
+                  <a14:useLocalDpi xmlns:a14="http://schemas.microsoft.com/office/drawing/2010/main" val="0"/>
+                </a:ext>
+              </a:extLst>
+            </a:blip>
             <a:stretch>
               <a:fillRect/>
             </a:stretch>
           </p:blipFill>
           <p:spPr>
             <a:xfrm>
-              <a:off x="5192451" y="5439428"/>
-              <a:ext cx="2390775" cy="523875"/>
+              <a:off x="4929387" y="2124416"/>
+              <a:ext cx="361929" cy="430449"/>
             </a:xfrm>
             <a:prstGeom prst="rect">
               <a:avLst/>
@@ -16610,10 +16638,10 @@
         </p:pic>
         <p:pic>
           <p:nvPicPr>
-            <p:cNvPr id="32" name="Picture 31">
+            <p:cNvPr id="31" name="Picture 30">
               <a:extLst>
                 <a:ext uri="{FF2B5EF4-FFF2-40B4-BE49-F238E27FC236}">
-                  <a16:creationId xmlns:a16="http://schemas.microsoft.com/office/drawing/2014/main" id="{BBB25823-707C-42E9-926E-7B2329A44B7C}"/>
+                  <a16:creationId xmlns:a16="http://schemas.microsoft.com/office/drawing/2014/main" id="{4C0B2D5E-055F-4FEE-B9C7-EA7BD9D72DB2}"/>
                 </a:ext>
               </a:extLst>
             </p:cNvPr>
@@ -16622,131 +16650,632 @@
             </p:cNvPicPr>
             <p:nvPr/>
           </p:nvPicPr>
-          <p:blipFill rotWithShape="1">
-            <a:blip r:embed="rId7"/>
-            <a:srcRect l="3594"/>
-            <a:stretch/>
+          <p:blipFill>
+            <a:blip r:embed="rId2" cstate="print">
+              <a:extLst>
+                <a:ext uri="{28A0092B-C50C-407E-A947-70E740481C1C}">
+                  <a14:useLocalDpi xmlns:a14="http://schemas.microsoft.com/office/drawing/2010/main" val="0"/>
+                </a:ext>
+              </a:extLst>
+            </a:blip>
+            <a:stretch>
+              <a:fillRect/>
+            </a:stretch>
           </p:blipFill>
           <p:spPr>
             <a:xfrm>
-              <a:off x="5303389" y="5881866"/>
-              <a:ext cx="2468844" cy="637837"/>
+              <a:off x="4917357" y="3030320"/>
+              <a:ext cx="361929" cy="430449"/>
             </a:xfrm>
             <a:prstGeom prst="rect">
               <a:avLst/>
             </a:prstGeom>
           </p:spPr>
         </p:pic>
-      </p:grpSp>
-      <p:grpSp>
-        <p:nvGrpSpPr>
-          <p:cNvPr id="19" name="Group 18">
-            <a:extLst>
-              <a:ext uri="{FF2B5EF4-FFF2-40B4-BE49-F238E27FC236}">
-                <a16:creationId xmlns:a16="http://schemas.microsoft.com/office/drawing/2014/main" id="{F15363A8-0E0B-4E88-8D7A-565DBA99DA80}"/>
-              </a:ext>
-            </a:extLst>
-          </p:cNvPr>
-          <p:cNvGrpSpPr/>
-          <p:nvPr/>
-        </p:nvGrpSpPr>
-        <p:grpSpPr>
-          <a:xfrm>
-            <a:off x="1044690" y="1908408"/>
-            <a:ext cx="279138" cy="2292002"/>
-            <a:chOff x="6519515" y="1938477"/>
-            <a:chExt cx="279138" cy="2292002"/>
-          </a:xfrm>
-        </p:grpSpPr>
-        <p:cxnSp>
-          <p:nvCxnSpPr>
-            <p:cNvPr id="21" name="Straight Arrow Connector 20">
+        <p:pic>
+          <p:nvPicPr>
+            <p:cNvPr id="34" name="Picture 33">
               <a:extLst>
                 <a:ext uri="{FF2B5EF4-FFF2-40B4-BE49-F238E27FC236}">
-                  <a16:creationId xmlns:a16="http://schemas.microsoft.com/office/drawing/2014/main" id="{EC146FA1-E058-4024-982F-05942913781F}"/>
+                  <a16:creationId xmlns:a16="http://schemas.microsoft.com/office/drawing/2014/main" id="{9C0F197C-2393-4D64-97F7-712454EF244F}"/>
                 </a:ext>
               </a:extLst>
             </p:cNvPr>
-            <p:cNvCxnSpPr>
-              <a:cxnSpLocks/>
-            </p:cNvCxnSpPr>
+            <p:cNvPicPr>
+              <a:picLocks noChangeAspect="1"/>
+            </p:cNvPicPr>
             <p:nvPr/>
-          </p:nvCxnSpPr>
+          </p:nvPicPr>
+          <p:blipFill>
+            <a:blip r:embed="rId2" cstate="print">
+              <a:extLst>
+                <a:ext uri="{28A0092B-C50C-407E-A947-70E740481C1C}">
+                  <a14:useLocalDpi xmlns:a14="http://schemas.microsoft.com/office/drawing/2010/main" val="0"/>
+                </a:ext>
+              </a:extLst>
+            </a:blip>
+            <a:stretch>
+              <a:fillRect/>
+            </a:stretch>
+          </p:blipFill>
           <p:spPr>
             <a:xfrm>
-              <a:off x="6519515" y="4230479"/>
-              <a:ext cx="279138" cy="0"/>
+              <a:off x="4917357" y="3976086"/>
+              <a:ext cx="361929" cy="430449"/>
             </a:xfrm>
-            <a:prstGeom prst="straightConnector1">
+            <a:prstGeom prst="rect">
               <a:avLst/>
             </a:prstGeom>
-            <a:ln w="28575">
-              <a:solidFill>
-                <a:srgbClr val="2D0028"/>
-              </a:solidFill>
-              <a:prstDash val="sysDash"/>
-              <a:tailEnd type="triangle"/>
-            </a:ln>
           </p:spPr>
-          <p:style>
-            <a:lnRef idx="1">
-              <a:schemeClr val="accent1"/>
-            </a:lnRef>
-            <a:fillRef idx="0">
-              <a:schemeClr val="accent1"/>
-            </a:fillRef>
-            <a:effectRef idx="0">
-              <a:schemeClr val="accent1"/>
-            </a:effectRef>
-            <a:fontRef idx="minor">
-              <a:schemeClr val="tx1"/>
-            </a:fontRef>
-          </p:style>
-        </p:cxnSp>
-        <p:cxnSp>
-          <p:nvCxnSpPr>
-            <p:cNvPr id="22" name="Straight Connector 21">
+        </p:pic>
+        <p:pic>
+          <p:nvPicPr>
+            <p:cNvPr id="35" name="Picture 34">
               <a:extLst>
                 <a:ext uri="{FF2B5EF4-FFF2-40B4-BE49-F238E27FC236}">
-                  <a16:creationId xmlns:a16="http://schemas.microsoft.com/office/drawing/2014/main" id="{D45F8391-67AE-46FF-9F1F-483E5A512E90}"/>
+                  <a16:creationId xmlns:a16="http://schemas.microsoft.com/office/drawing/2014/main" id="{8E03FCB1-49F2-4769-BAA8-C086704CAE0D}"/>
                 </a:ext>
               </a:extLst>
             </p:cNvPr>
-            <p:cNvCxnSpPr>
-              <a:cxnSpLocks/>
-            </p:cNvCxnSpPr>
+            <p:cNvPicPr>
+              <a:picLocks noChangeAspect="1"/>
+            </p:cNvPicPr>
             <p:nvPr/>
-          </p:nvCxnSpPr>
+          </p:nvPicPr>
+          <p:blipFill>
+            <a:blip r:embed="rId2" cstate="print">
+              <a:extLst>
+                <a:ext uri="{28A0092B-C50C-407E-A947-70E740481C1C}">
+                  <a14:useLocalDpi xmlns:a14="http://schemas.microsoft.com/office/drawing/2010/main" val="0"/>
+                </a:ext>
+              </a:extLst>
+            </a:blip>
+            <a:stretch>
+              <a:fillRect/>
+            </a:stretch>
+          </p:blipFill>
           <p:spPr>
             <a:xfrm>
-              <a:off x="6519515" y="1938477"/>
-              <a:ext cx="0" cy="2292002"/>
+              <a:off x="4917357" y="4870829"/>
+              <a:ext cx="361929" cy="430449"/>
             </a:xfrm>
-            <a:prstGeom prst="line">
+            <a:prstGeom prst="rect">
               <a:avLst/>
             </a:prstGeom>
-            <a:ln w="28575">
-              <a:solidFill>
-                <a:srgbClr val="2D0028"/>
-              </a:solidFill>
-              <a:prstDash val="sysDash"/>
-            </a:ln>
           </p:spPr>
-          <p:style>
-            <a:lnRef idx="1">
-              <a:schemeClr val="accent1"/>
-            </a:lnRef>
-            <a:fillRef idx="0">
-              <a:schemeClr val="accent1"/>
-            </a:fillRef>
-            <a:effectRef idx="0">
-              <a:schemeClr val="accent1"/>
-            </a:effectRef>
-            <a:fontRef idx="minor">
-              <a:schemeClr val="tx1"/>
-            </a:fontRef>
-          </p:style>
-        </p:cxnSp>
+        </p:pic>
+        <p:pic>
+          <p:nvPicPr>
+            <p:cNvPr id="36" name="Picture 35">
+              <a:extLst>
+                <a:ext uri="{FF2B5EF4-FFF2-40B4-BE49-F238E27FC236}">
+                  <a16:creationId xmlns:a16="http://schemas.microsoft.com/office/drawing/2014/main" id="{01378495-D719-434D-8DE7-075531EE9910}"/>
+                </a:ext>
+              </a:extLst>
+            </p:cNvPr>
+            <p:cNvPicPr>
+              <a:picLocks noChangeAspect="1"/>
+            </p:cNvPicPr>
+            <p:nvPr/>
+          </p:nvPicPr>
+          <p:blipFill>
+            <a:blip r:embed="rId2" cstate="print">
+              <a:extLst>
+                <a:ext uri="{28A0092B-C50C-407E-A947-70E740481C1C}">
+                  <a14:useLocalDpi xmlns:a14="http://schemas.microsoft.com/office/drawing/2010/main" val="0"/>
+                </a:ext>
+              </a:extLst>
+            </a:blip>
+            <a:stretch>
+              <a:fillRect/>
+            </a:stretch>
+          </p:blipFill>
+          <p:spPr>
+            <a:xfrm>
+              <a:off x="4917357" y="5743024"/>
+              <a:ext cx="361929" cy="430449"/>
+            </a:xfrm>
+            <a:prstGeom prst="rect">
+              <a:avLst/>
+            </a:prstGeom>
+          </p:spPr>
+        </p:pic>
+        <p:sp>
+          <p:nvSpPr>
+            <p:cNvPr id="37" name="TextBox 36">
+              <a:extLst>
+                <a:ext uri="{FF2B5EF4-FFF2-40B4-BE49-F238E27FC236}">
+                  <a16:creationId xmlns:a16="http://schemas.microsoft.com/office/drawing/2014/main" id="{DA7B23AB-E0D4-4415-8CCE-F234EE5ED58E}"/>
+                </a:ext>
+              </a:extLst>
+            </p:cNvPr>
+            <p:cNvSpPr txBox="1"/>
+            <p:nvPr/>
+          </p:nvSpPr>
+          <p:spPr>
+            <a:xfrm>
+              <a:off x="7293643" y="3076616"/>
+              <a:ext cx="3086100" cy="358240"/>
+            </a:xfrm>
+            <a:prstGeom prst="rect">
+              <a:avLst/>
+            </a:prstGeom>
+            <a:noFill/>
+          </p:spPr>
+          <p:txBody>
+            <a:bodyPr wrap="square" lIns="0" tIns="0" rIns="0" bIns="0" rtlCol="0">
+              <a:spAutoFit/>
+            </a:bodyPr>
+            <a:lstStyle/>
+            <a:p>
+              <a:pPr>
+                <a:lnSpc>
+                  <a:spcPct val="97000"/>
+                </a:lnSpc>
+              </a:pPr>
+              <a:r>
+                <a:rPr lang="en-US" sz="2400" dirty="0" err="1">
+                  <a:solidFill>
+                    <a:srgbClr val="2C9FD1"/>
+                  </a:solidFill>
+                </a:rPr>
+                <a:t>SearchGUI</a:t>
+              </a:r>
+              <a:endParaRPr lang="en-US" sz="2400" dirty="0">
+                <a:solidFill>
+                  <a:srgbClr val="2C9FD1"/>
+                </a:solidFill>
+              </a:endParaRPr>
+            </a:p>
+          </p:txBody>
+        </p:sp>
+        <p:sp>
+          <p:nvSpPr>
+            <p:cNvPr id="38" name="TextBox 37">
+              <a:extLst>
+                <a:ext uri="{FF2B5EF4-FFF2-40B4-BE49-F238E27FC236}">
+                  <a16:creationId xmlns:a16="http://schemas.microsoft.com/office/drawing/2014/main" id="{F2006EA5-9CD9-400D-BAD6-1041641E6D93}"/>
+                </a:ext>
+              </a:extLst>
+            </p:cNvPr>
+            <p:cNvSpPr txBox="1"/>
+            <p:nvPr/>
+          </p:nvSpPr>
+          <p:spPr>
+            <a:xfrm>
+              <a:off x="7293643" y="4048295"/>
+              <a:ext cx="3086100" cy="358240"/>
+            </a:xfrm>
+            <a:prstGeom prst="rect">
+              <a:avLst/>
+            </a:prstGeom>
+            <a:noFill/>
+          </p:spPr>
+          <p:txBody>
+            <a:bodyPr wrap="square" lIns="0" tIns="0" rIns="0" bIns="0" rtlCol="0">
+              <a:spAutoFit/>
+            </a:bodyPr>
+            <a:lstStyle/>
+            <a:p>
+              <a:pPr>
+                <a:lnSpc>
+                  <a:spcPct val="97000"/>
+                </a:lnSpc>
+              </a:pPr>
+              <a:r>
+                <a:rPr lang="en-US" sz="2400" dirty="0" err="1">
+                  <a:solidFill>
+                    <a:srgbClr val="2C9FD1"/>
+                  </a:solidFill>
+                </a:rPr>
+                <a:t>peptideShaker</a:t>
+              </a:r>
+              <a:endParaRPr lang="en-US" sz="2400" dirty="0">
+                <a:solidFill>
+                  <a:srgbClr val="2C9FD1"/>
+                </a:solidFill>
+              </a:endParaRPr>
+            </a:p>
+          </p:txBody>
+        </p:sp>
+        <p:sp>
+          <p:nvSpPr>
+            <p:cNvPr id="39" name="TextBox 38">
+              <a:extLst>
+                <a:ext uri="{FF2B5EF4-FFF2-40B4-BE49-F238E27FC236}">
+                  <a16:creationId xmlns:a16="http://schemas.microsoft.com/office/drawing/2014/main" id="{C2A27788-4456-48D6-A740-F9CE2B355B82}"/>
+                </a:ext>
+              </a:extLst>
+            </p:cNvPr>
+            <p:cNvSpPr txBox="1"/>
+            <p:nvPr/>
+          </p:nvSpPr>
+          <p:spPr>
+            <a:xfrm>
+              <a:off x="7293643" y="4943038"/>
+              <a:ext cx="3086100" cy="358240"/>
+            </a:xfrm>
+            <a:prstGeom prst="rect">
+              <a:avLst/>
+            </a:prstGeom>
+            <a:noFill/>
+          </p:spPr>
+          <p:txBody>
+            <a:bodyPr wrap="square" lIns="0" tIns="0" rIns="0" bIns="0" rtlCol="0">
+              <a:spAutoFit/>
+            </a:bodyPr>
+            <a:lstStyle/>
+            <a:p>
+              <a:pPr>
+                <a:lnSpc>
+                  <a:spcPct val="97000"/>
+                </a:lnSpc>
+              </a:pPr>
+              <a:r>
+                <a:rPr lang="en-US" sz="2400" dirty="0" err="1">
+                  <a:solidFill>
+                    <a:srgbClr val="2C9FD1"/>
+                  </a:solidFill>
+                </a:rPr>
+                <a:t>moFF</a:t>
+              </a:r>
+              <a:endParaRPr lang="en-US" sz="2400" dirty="0">
+                <a:solidFill>
+                  <a:srgbClr val="2C9FD1"/>
+                </a:solidFill>
+              </a:endParaRPr>
+            </a:p>
+          </p:txBody>
+        </p:sp>
+        <p:sp>
+          <p:nvSpPr>
+            <p:cNvPr id="40" name="TextBox 39">
+              <a:extLst>
+                <a:ext uri="{FF2B5EF4-FFF2-40B4-BE49-F238E27FC236}">
+                  <a16:creationId xmlns:a16="http://schemas.microsoft.com/office/drawing/2014/main" id="{0862142B-9DA3-439B-B43C-C7C551455E8B}"/>
+                </a:ext>
+              </a:extLst>
+            </p:cNvPr>
+            <p:cNvSpPr txBox="1"/>
+            <p:nvPr/>
+          </p:nvSpPr>
+          <p:spPr>
+            <a:xfrm>
+              <a:off x="7293643" y="5815233"/>
+              <a:ext cx="1412924" cy="358240"/>
+            </a:xfrm>
+            <a:prstGeom prst="rect">
+              <a:avLst/>
+            </a:prstGeom>
+            <a:noFill/>
+          </p:spPr>
+          <p:txBody>
+            <a:bodyPr wrap="square" lIns="0" tIns="0" rIns="0" bIns="0" rtlCol="0">
+              <a:spAutoFit/>
+            </a:bodyPr>
+            <a:lstStyle/>
+            <a:p>
+              <a:pPr>
+                <a:lnSpc>
+                  <a:spcPct val="97000"/>
+                </a:lnSpc>
+              </a:pPr>
+              <a:r>
+                <a:rPr lang="en-US" sz="2400" dirty="0" err="1">
+                  <a:solidFill>
+                    <a:srgbClr val="2C9FD1"/>
+                  </a:solidFill>
+                </a:rPr>
+                <a:t>MSqRob</a:t>
+              </a:r>
+              <a:endParaRPr lang="en-US" sz="2400" dirty="0">
+                <a:solidFill>
+                  <a:srgbClr val="2C9FD1"/>
+                </a:solidFill>
+              </a:endParaRPr>
+            </a:p>
+          </p:txBody>
+        </p:sp>
+        <p:pic>
+          <p:nvPicPr>
+            <p:cNvPr id="29" name="Picture 28">
+              <a:extLst>
+                <a:ext uri="{FF2B5EF4-FFF2-40B4-BE49-F238E27FC236}">
+                  <a16:creationId xmlns:a16="http://schemas.microsoft.com/office/drawing/2014/main" id="{43BA9C91-3C24-4F3F-85DA-826C82BD9FC7}"/>
+                </a:ext>
+              </a:extLst>
+            </p:cNvPr>
+            <p:cNvPicPr>
+              <a:picLocks noChangeAspect="1"/>
+            </p:cNvPicPr>
+            <p:nvPr/>
+          </p:nvPicPr>
+          <p:blipFill>
+            <a:blip r:embed="rId3" cstate="print">
+              <a:extLst>
+                <a:ext uri="{28A0092B-C50C-407E-A947-70E740481C1C}">
+                  <a14:useLocalDpi xmlns:a14="http://schemas.microsoft.com/office/drawing/2010/main" val="0"/>
+                </a:ext>
+              </a:extLst>
+            </a:blip>
+            <a:stretch>
+              <a:fillRect/>
+            </a:stretch>
+          </p:blipFill>
+          <p:spPr>
+            <a:xfrm>
+              <a:off x="5984359" y="4696179"/>
+              <a:ext cx="778721" cy="778721"/>
+            </a:xfrm>
+            <a:prstGeom prst="rect">
+              <a:avLst/>
+            </a:prstGeom>
+          </p:spPr>
+        </p:pic>
+        <p:pic>
+          <p:nvPicPr>
+            <p:cNvPr id="42" name="Picture 41">
+              <a:extLst>
+                <a:ext uri="{FF2B5EF4-FFF2-40B4-BE49-F238E27FC236}">
+                  <a16:creationId xmlns:a16="http://schemas.microsoft.com/office/drawing/2014/main" id="{9BF883A7-7693-4AB1-ABA2-5451CF3817F3}"/>
+                </a:ext>
+              </a:extLst>
+            </p:cNvPr>
+            <p:cNvPicPr>
+              <a:picLocks noChangeAspect="1"/>
+            </p:cNvPicPr>
+            <p:nvPr/>
+          </p:nvPicPr>
+          <p:blipFill>
+            <a:blip r:embed="rId4" cstate="print">
+              <a:extLst>
+                <a:ext uri="{28A0092B-C50C-407E-A947-70E740481C1C}">
+                  <a14:useLocalDpi xmlns:a14="http://schemas.microsoft.com/office/drawing/2010/main" val="0"/>
+                </a:ext>
+              </a:extLst>
+            </a:blip>
+            <a:stretch>
+              <a:fillRect/>
+            </a:stretch>
+          </p:blipFill>
+          <p:spPr>
+            <a:xfrm>
+              <a:off x="6096011" y="5743024"/>
+              <a:ext cx="555418" cy="430449"/>
+            </a:xfrm>
+            <a:prstGeom prst="rect">
+              <a:avLst/>
+            </a:prstGeom>
+          </p:spPr>
+        </p:pic>
+        <p:pic>
+          <p:nvPicPr>
+            <p:cNvPr id="44" name="Picture 43">
+              <a:extLst>
+                <a:ext uri="{FF2B5EF4-FFF2-40B4-BE49-F238E27FC236}">
+                  <a16:creationId xmlns:a16="http://schemas.microsoft.com/office/drawing/2014/main" id="{4CE4E55D-BE43-4D5B-933D-6FF68006AF6C}"/>
+                </a:ext>
+              </a:extLst>
+            </p:cNvPr>
+            <p:cNvPicPr>
+              <a:picLocks noChangeAspect="1"/>
+            </p:cNvPicPr>
+            <p:nvPr/>
+          </p:nvPicPr>
+          <p:blipFill>
+            <a:blip r:embed="rId5" cstate="print">
+              <a:extLst>
+                <a:ext uri="{28A0092B-C50C-407E-A947-70E740481C1C}">
+                  <a14:useLocalDpi xmlns:a14="http://schemas.microsoft.com/office/drawing/2010/main" val="0"/>
+                </a:ext>
+              </a:extLst>
+            </a:blip>
+            <a:stretch>
+              <a:fillRect/>
+            </a:stretch>
+          </p:blipFill>
+          <p:spPr>
+            <a:xfrm>
+              <a:off x="6097757" y="3808554"/>
+              <a:ext cx="597981" cy="597981"/>
+            </a:xfrm>
+            <a:prstGeom prst="rect">
+              <a:avLst/>
+            </a:prstGeom>
+          </p:spPr>
+        </p:pic>
+        <p:pic>
+          <p:nvPicPr>
+            <p:cNvPr id="45" name="Picture 44">
+              <a:extLst>
+                <a:ext uri="{FF2B5EF4-FFF2-40B4-BE49-F238E27FC236}">
+                  <a16:creationId xmlns:a16="http://schemas.microsoft.com/office/drawing/2014/main" id="{1F4789DF-379C-42A0-A5C1-817B19163538}"/>
+                </a:ext>
+              </a:extLst>
+            </p:cNvPr>
+            <p:cNvPicPr>
+              <a:picLocks noChangeAspect="1"/>
+            </p:cNvPicPr>
+            <p:nvPr/>
+          </p:nvPicPr>
+          <p:blipFill>
+            <a:blip r:embed="rId5" cstate="print">
+              <a:extLst>
+                <a:ext uri="{28A0092B-C50C-407E-A947-70E740481C1C}">
+                  <a14:useLocalDpi xmlns:a14="http://schemas.microsoft.com/office/drawing/2010/main" val="0"/>
+                </a:ext>
+              </a:extLst>
+            </a:blip>
+            <a:stretch>
+              <a:fillRect/>
+            </a:stretch>
+          </p:blipFill>
+          <p:spPr>
+            <a:xfrm>
+              <a:off x="6097757" y="2881976"/>
+              <a:ext cx="597981" cy="597981"/>
+            </a:xfrm>
+            <a:prstGeom prst="rect">
+              <a:avLst/>
+            </a:prstGeom>
+          </p:spPr>
+        </p:pic>
+        <p:pic>
+          <p:nvPicPr>
+            <p:cNvPr id="49" name="Picture 48">
+              <a:extLst>
+                <a:ext uri="{FF2B5EF4-FFF2-40B4-BE49-F238E27FC236}">
+                  <a16:creationId xmlns:a16="http://schemas.microsoft.com/office/drawing/2014/main" id="{F3433B79-8A68-47B1-899D-45F33DB7E430}"/>
+                </a:ext>
+              </a:extLst>
+            </p:cNvPr>
+            <p:cNvPicPr>
+              <a:picLocks noChangeAspect="1"/>
+            </p:cNvPicPr>
+            <p:nvPr/>
+          </p:nvPicPr>
+          <p:blipFill>
+            <a:blip r:embed="rId6" cstate="print">
+              <a:extLst>
+                <a:ext uri="{28A0092B-C50C-407E-A947-70E740481C1C}">
+                  <a14:useLocalDpi xmlns:a14="http://schemas.microsoft.com/office/drawing/2010/main" val="0"/>
+                </a:ext>
+              </a:extLst>
+            </a:blip>
+            <a:stretch>
+              <a:fillRect/>
+            </a:stretch>
+          </p:blipFill>
+          <p:spPr>
+            <a:xfrm>
+              <a:off x="6156312" y="2047935"/>
+              <a:ext cx="434816" cy="559360"/>
+            </a:xfrm>
+            <a:prstGeom prst="rect">
+              <a:avLst/>
+            </a:prstGeom>
+          </p:spPr>
+        </p:pic>
+        <p:sp>
+          <p:nvSpPr>
+            <p:cNvPr id="51" name="TextBox 50">
+              <a:extLst>
+                <a:ext uri="{FF2B5EF4-FFF2-40B4-BE49-F238E27FC236}">
+                  <a16:creationId xmlns:a16="http://schemas.microsoft.com/office/drawing/2014/main" id="{BE6E19BC-308E-49C7-8061-81B20A9C4A16}"/>
+                </a:ext>
+              </a:extLst>
+            </p:cNvPr>
+            <p:cNvSpPr txBox="1"/>
+            <p:nvPr/>
+          </p:nvSpPr>
+          <p:spPr>
+            <a:xfrm>
+              <a:off x="4650250" y="1373023"/>
+              <a:ext cx="937549" cy="417935"/>
+            </a:xfrm>
+            <a:prstGeom prst="rect">
+              <a:avLst/>
+            </a:prstGeom>
+            <a:noFill/>
+          </p:spPr>
+          <p:txBody>
+            <a:bodyPr wrap="square" lIns="0" tIns="0" rIns="0" bIns="0" rtlCol="0">
+              <a:spAutoFit/>
+            </a:bodyPr>
+            <a:lstStyle/>
+            <a:p>
+              <a:pPr algn="ctr">
+                <a:lnSpc>
+                  <a:spcPct val="97000"/>
+                </a:lnSpc>
+              </a:pPr>
+              <a:r>
+                <a:rPr lang="en-US" sz="2800" b="1" dirty="0"/>
+                <a:t>OS</a:t>
+              </a:r>
+            </a:p>
+          </p:txBody>
+        </p:sp>
+        <p:sp>
+          <p:nvSpPr>
+            <p:cNvPr id="52" name="TextBox 51">
+              <a:extLst>
+                <a:ext uri="{FF2B5EF4-FFF2-40B4-BE49-F238E27FC236}">
+                  <a16:creationId xmlns:a16="http://schemas.microsoft.com/office/drawing/2014/main" id="{28C601F8-CD8F-4D16-B435-15AE4763A939}"/>
+                </a:ext>
+              </a:extLst>
+            </p:cNvPr>
+            <p:cNvSpPr txBox="1"/>
+            <p:nvPr/>
+          </p:nvSpPr>
+          <p:spPr>
+            <a:xfrm>
+              <a:off x="5606578" y="955088"/>
+              <a:ext cx="1641752" cy="835870"/>
+            </a:xfrm>
+            <a:prstGeom prst="rect">
+              <a:avLst/>
+            </a:prstGeom>
+            <a:noFill/>
+          </p:spPr>
+          <p:txBody>
+            <a:bodyPr wrap="square" lIns="0" tIns="0" rIns="0" bIns="0" rtlCol="0">
+              <a:spAutoFit/>
+            </a:bodyPr>
+            <a:lstStyle/>
+            <a:p>
+              <a:pPr algn="ctr">
+                <a:lnSpc>
+                  <a:spcPct val="97000"/>
+                </a:lnSpc>
+              </a:pPr>
+              <a:r>
+                <a:rPr lang="en-US" sz="2800" b="1" dirty="0"/>
+                <a:t>Main Platform</a:t>
+              </a:r>
+            </a:p>
+          </p:txBody>
+        </p:sp>
+        <p:sp>
+          <p:nvSpPr>
+            <p:cNvPr id="53" name="TextBox 52">
+              <a:extLst>
+                <a:ext uri="{FF2B5EF4-FFF2-40B4-BE49-F238E27FC236}">
+                  <a16:creationId xmlns:a16="http://schemas.microsoft.com/office/drawing/2014/main" id="{668B9C72-CDA3-45A0-BB0A-5C3577791F63}"/>
+                </a:ext>
+              </a:extLst>
+            </p:cNvPr>
+            <p:cNvSpPr txBox="1"/>
+            <p:nvPr/>
+          </p:nvSpPr>
+          <p:spPr>
+            <a:xfrm>
+              <a:off x="7721273" y="955088"/>
+              <a:ext cx="1641752" cy="835870"/>
+            </a:xfrm>
+            <a:prstGeom prst="rect">
+              <a:avLst/>
+            </a:prstGeom>
+            <a:noFill/>
+          </p:spPr>
+          <p:txBody>
+            <a:bodyPr wrap="square" lIns="0" tIns="0" rIns="0" bIns="0" rtlCol="0">
+              <a:spAutoFit/>
+            </a:bodyPr>
+            <a:lstStyle/>
+            <a:p>
+              <a:pPr algn="ctr">
+                <a:lnSpc>
+                  <a:spcPct val="97000"/>
+                </a:lnSpc>
+              </a:pPr>
+              <a:r>
+                <a:rPr lang="en-US" sz="2800" b="1" dirty="0"/>
+                <a:t>Program Name</a:t>
+              </a:r>
+            </a:p>
+          </p:txBody>
+        </p:sp>
       </p:grpSp>
     </p:spTree>
     <p:extLst>

</xml_diff>